<commit_message>
updated data in schematic and report pdf and ppt.
</commit_message>
<xml_diff>
--- a/documentation/FinalPresentation_UncannyValley.pptx
+++ b/documentation/FinalPresentation_UncannyValley.pptx
@@ -5,20 +5,24 @@
     <p:sldMasterId id="2147483683" r:id="rId1"/>
   </p:sldMasterIdLst>
   <p:notesMasterIdLst>
-    <p:notesMasterId r:id="rId13"/>
+    <p:notesMasterId r:id="rId17"/>
   </p:notesMasterIdLst>
   <p:sldIdLst>
     <p:sldId id="256" r:id="rId2"/>
-    <p:sldId id="264" r:id="rId3"/>
-    <p:sldId id="265" r:id="rId4"/>
-    <p:sldId id="261" r:id="rId5"/>
-    <p:sldId id="257" r:id="rId6"/>
-    <p:sldId id="266" r:id="rId7"/>
-    <p:sldId id="260" r:id="rId8"/>
-    <p:sldId id="263" r:id="rId9"/>
-    <p:sldId id="259" r:id="rId10"/>
-    <p:sldId id="262" r:id="rId11"/>
-    <p:sldId id="267" r:id="rId12"/>
+    <p:sldId id="271" r:id="rId3"/>
+    <p:sldId id="264" r:id="rId4"/>
+    <p:sldId id="268" r:id="rId5"/>
+    <p:sldId id="265" r:id="rId6"/>
+    <p:sldId id="261" r:id="rId7"/>
+    <p:sldId id="257" r:id="rId8"/>
+    <p:sldId id="266" r:id="rId9"/>
+    <p:sldId id="260" r:id="rId10"/>
+    <p:sldId id="263" r:id="rId11"/>
+    <p:sldId id="259" r:id="rId12"/>
+    <p:sldId id="262" r:id="rId13"/>
+    <p:sldId id="267" r:id="rId14"/>
+    <p:sldId id="269" r:id="rId15"/>
+    <p:sldId id="270" r:id="rId16"/>
   </p:sldIdLst>
   <p:sldSz cx="12192000" cy="6858000"/>
   <p:notesSz cx="6858000" cy="9144000"/>
@@ -543,7 +547,7 @@
           <a:p>
             <a:fld id="{0FE165E9-2381-49E2-9334-DE60C7D77338}" type="slidenum">
               <a:rPr lang="en-IN" smtClean="0"/>
-              <a:t>5</a:t>
+              <a:t>7</a:t>
             </a:fld>
             <a:endParaRPr lang="en-IN"/>
           </a:p>
@@ -607,7 +611,7 @@
             <a:fld id="{DC7476EB-C220-B24E-AD31-90775CD5D87E}" type="slidenum">
               <a:rPr lang="en-US"/>
               <a:pPr/>
-              <a:t>9</a:t>
+              <a:t>11</a:t>
             </a:fld>
             <a:endParaRPr lang="en-US"/>
           </a:p>
@@ -617,7 +621,7 @@
         <p:nvSpPr>
           <p:cNvPr id="6145" name="Text Box 1"/>
           <p:cNvSpPr txBox="1">
-            <a:spLocks noChangeArrowheads="1"/>
+            <a:spLocks noGrp="1" noRot="1" noChangeAspect="1" noChangeArrowheads="1"/>
           </p:cNvSpPr>
           <p:nvPr>
             <p:ph type="sldImg"/>
@@ -661,7 +665,7 @@
         <p:nvSpPr>
           <p:cNvPr id="6146" name="Text Box 2"/>
           <p:cNvSpPr txBox="1">
-            <a:spLocks noChangeArrowheads="1"/>
+            <a:spLocks noGrp="1" noChangeArrowheads="1"/>
           </p:cNvSpPr>
           <p:nvPr>
             <p:ph type="body" idx="1"/>
@@ -7236,1149 +7240,6 @@
           <a:chExt cx="0" cy="0"/>
         </a:xfrm>
       </p:grpSpPr>
-      <p:pic>
-        <p:nvPicPr>
-          <p:cNvPr id="5" name="Picture 4" descr="single_leaf_shadow_volume_for_ppt.png"/>
-          <p:cNvPicPr>
-            <a:picLocks noChangeAspect="1"/>
-          </p:cNvPicPr>
-          <p:nvPr/>
-        </p:nvPicPr>
-        <p:blipFill>
-          <a:blip r:embed="rId2">
-            <a:extLst>
-              <a:ext uri="{28A0092B-C50C-407E-A947-70E740481C1C}">
-                <a14:useLocalDpi xmlns:a14="http://schemas.microsoft.com/office/drawing/2010/main" val="0"/>
-              </a:ext>
-            </a:extLst>
-          </a:blip>
-          <a:stretch>
-            <a:fillRect/>
-          </a:stretch>
-        </p:blipFill>
-        <p:spPr>
-          <a:xfrm>
-            <a:off x="6594120" y="1766705"/>
-            <a:ext cx="4895850" cy="4876800"/>
-          </a:xfrm>
-          <a:prstGeom prst="rect">
-            <a:avLst/>
-          </a:prstGeom>
-        </p:spPr>
-      </p:pic>
-      <p:sp>
-        <p:nvSpPr>
-          <p:cNvPr id="6" name="TextBox 5"/>
-          <p:cNvSpPr txBox="1"/>
-          <p:nvPr/>
-        </p:nvSpPr>
-        <p:spPr>
-          <a:xfrm>
-            <a:off x="2794000" y="804336"/>
-            <a:ext cx="6929977" cy="646331"/>
-          </a:xfrm>
-          <a:prstGeom prst="rect">
-            <a:avLst/>
-          </a:prstGeom>
-          <a:noFill/>
-        </p:spPr>
-        <p:txBody>
-          <a:bodyPr wrap="none" rtlCol="0">
-            <a:spAutoFit/>
-          </a:bodyPr>
-          <a:lstStyle/>
-          <a:p>
-            <a:r>
-              <a:rPr lang="en-US" sz="3600" dirty="0" smtClean="0"/>
-              <a:t>How the Shadow Volume Grows ?</a:t>
-            </a:r>
-            <a:endParaRPr lang="en-US" sz="3600" dirty="0"/>
-          </a:p>
-        </p:txBody>
-      </p:sp>
-      <p:sp>
-        <p:nvSpPr>
-          <p:cNvPr id="7" name="TextBox 6"/>
-          <p:cNvSpPr txBox="1"/>
-          <p:nvPr/>
-        </p:nvSpPr>
-        <p:spPr>
-          <a:xfrm>
-            <a:off x="635000" y="1834444"/>
-            <a:ext cx="5941350" cy="4524315"/>
-          </a:xfrm>
-          <a:prstGeom prst="rect">
-            <a:avLst/>
-          </a:prstGeom>
-          <a:noFill/>
-        </p:spPr>
-        <p:txBody>
-          <a:bodyPr wrap="none" rtlCol="0">
-            <a:spAutoFit/>
-          </a:bodyPr>
-          <a:lstStyle/>
-          <a:p>
-            <a:r>
-              <a:rPr lang="en-US" sz="2400" dirty="0" smtClean="0"/>
-              <a:t>Previous slide showed a compactly spaced </a:t>
-            </a:r>
-          </a:p>
-          <a:p>
-            <a:r>
-              <a:rPr lang="en-US" sz="2400" dirty="0" smtClean="0"/>
-              <a:t>Shadow Volume.</a:t>
-            </a:r>
-          </a:p>
-          <a:p>
-            <a:endParaRPr lang="en-US" sz="2400" dirty="0"/>
-          </a:p>
-          <a:p>
-            <a:r>
-              <a:rPr lang="en-US" sz="2400" dirty="0" smtClean="0"/>
-              <a:t>The figure along side gives a better </a:t>
-            </a:r>
-          </a:p>
-          <a:p>
-            <a:r>
-              <a:rPr lang="en-US" sz="2400" dirty="0" smtClean="0"/>
-              <a:t>understanding of the consideration of </a:t>
-            </a:r>
-          </a:p>
-          <a:p>
-            <a:r>
-              <a:rPr lang="en-US" sz="2400" dirty="0" smtClean="0"/>
-              <a:t>multiple plane usage for shadow</a:t>
-            </a:r>
-          </a:p>
-          <a:p>
-            <a:r>
-              <a:rPr lang="en-US" sz="2400" dirty="0" smtClean="0"/>
-              <a:t>Rendering.</a:t>
-            </a:r>
-          </a:p>
-          <a:p>
-            <a:endParaRPr lang="en-US" sz="2400" dirty="0"/>
-          </a:p>
-          <a:p>
-            <a:r>
-              <a:rPr lang="en-US" sz="2400" dirty="0" smtClean="0"/>
-              <a:t>As the distance from the object increases the </a:t>
-            </a:r>
-          </a:p>
-          <a:p>
-            <a:r>
-              <a:rPr lang="en-US" sz="2400" dirty="0" smtClean="0"/>
-              <a:t>Shadow </a:t>
-            </a:r>
-            <a:r>
-              <a:rPr lang="en-US" sz="2400" dirty="0"/>
-              <a:t>b</a:t>
-            </a:r>
-            <a:r>
-              <a:rPr lang="en-US" sz="2400" dirty="0" smtClean="0"/>
-              <a:t>ecomes larger and fades out. The </a:t>
-            </a:r>
-          </a:p>
-          <a:p>
-            <a:r>
-              <a:rPr lang="en-US" sz="2400" dirty="0" smtClean="0"/>
-              <a:t>shadow plan here is sparsely spaced. Hence </a:t>
-            </a:r>
-          </a:p>
-          <a:p>
-            <a:r>
-              <a:rPr lang="en-US" sz="2400" dirty="0" smtClean="0"/>
-              <a:t>the </a:t>
-            </a:r>
-            <a:r>
-              <a:rPr lang="en-US" sz="2400" dirty="0" err="1" smtClean="0"/>
-              <a:t>glitchy</a:t>
-            </a:r>
-            <a:r>
-              <a:rPr lang="en-US" sz="2400" dirty="0" smtClean="0"/>
-              <a:t> spaced shadow volume render.</a:t>
-            </a:r>
-            <a:endParaRPr lang="en-US" sz="2400" dirty="0"/>
-          </a:p>
-        </p:txBody>
-      </p:sp>
-    </p:spTree>
-    <p:extLst>
-      <p:ext uri="{BB962C8B-B14F-4D97-AF65-F5344CB8AC3E}">
-        <p14:creationId xmlns:p14="http://schemas.microsoft.com/office/powerpoint/2010/main" val="3425757638"/>
-      </p:ext>
-    </p:extLst>
-  </p:cSld>
-  <p:clrMapOvr>
-    <a:masterClrMapping/>
-  </p:clrMapOvr>
-</p:sld>
-</file>
-
-<file path=ppt/slides/slide11.xml><?xml version="1.0" encoding="utf-8"?>
-<p:sld xmlns:a="http://schemas.openxmlformats.org/drawingml/2006/main" xmlns:r="http://schemas.openxmlformats.org/officeDocument/2006/relationships" xmlns:p="http://schemas.openxmlformats.org/presentationml/2006/main">
-  <p:cSld>
-    <p:spTree>
-      <p:nvGrpSpPr>
-        <p:cNvPr id="1" name=""/>
-        <p:cNvGrpSpPr/>
-        <p:nvPr/>
-      </p:nvGrpSpPr>
-      <p:grpSpPr>
-        <a:xfrm>
-          <a:off x="0" y="0"/>
-          <a:ext cx="0" cy="0"/>
-          <a:chOff x="0" y="0"/>
-          <a:chExt cx="0" cy="0"/>
-        </a:xfrm>
-      </p:grpSpPr>
-      <p:sp>
-        <p:nvSpPr>
-          <p:cNvPr id="2" name="Title 1"/>
-          <p:cNvSpPr>
-            <a:spLocks noGrp="1"/>
-          </p:cNvSpPr>
-          <p:nvPr>
-            <p:ph type="title"/>
-          </p:nvPr>
-        </p:nvSpPr>
-        <p:spPr/>
-        <p:txBody>
-          <a:bodyPr/>
-          <a:lstStyle/>
-          <a:p>
-            <a:r>
-              <a:rPr lang="en-US" dirty="0" smtClean="0"/>
-              <a:t>Challenges</a:t>
-            </a:r>
-            <a:endParaRPr lang="en-US" dirty="0"/>
-          </a:p>
-        </p:txBody>
-      </p:sp>
-      <p:sp>
-        <p:nvSpPr>
-          <p:cNvPr id="3" name="Content Placeholder 2"/>
-          <p:cNvSpPr>
-            <a:spLocks noGrp="1"/>
-          </p:cNvSpPr>
-          <p:nvPr>
-            <p:ph idx="1"/>
-          </p:nvPr>
-        </p:nvSpPr>
-        <p:spPr/>
-        <p:txBody>
-          <a:bodyPr/>
-          <a:lstStyle/>
-          <a:p>
-            <a:endParaRPr lang="en-US"/>
-          </a:p>
-        </p:txBody>
-      </p:sp>
-    </p:spTree>
-    <p:extLst>
-      <p:ext uri="{BB962C8B-B14F-4D97-AF65-F5344CB8AC3E}">
-        <p14:creationId xmlns:p14="http://schemas.microsoft.com/office/powerpoint/2010/main" val="1489819735"/>
-      </p:ext>
-    </p:extLst>
-  </p:cSld>
-  <p:clrMapOvr>
-    <a:masterClrMapping/>
-  </p:clrMapOvr>
-</p:sld>
-</file>
-
-<file path=ppt/slides/slide2.xml><?xml version="1.0" encoding="utf-8"?>
-<p:sld xmlns:a="http://schemas.openxmlformats.org/drawingml/2006/main" xmlns:r="http://schemas.openxmlformats.org/officeDocument/2006/relationships" xmlns:p="http://schemas.openxmlformats.org/presentationml/2006/main">
-  <p:cSld>
-    <p:spTree>
-      <p:nvGrpSpPr>
-        <p:cNvPr id="1" name=""/>
-        <p:cNvGrpSpPr/>
-        <p:nvPr/>
-      </p:nvGrpSpPr>
-      <p:grpSpPr>
-        <a:xfrm>
-          <a:off x="0" y="0"/>
-          <a:ext cx="0" cy="0"/>
-          <a:chOff x="0" y="0"/>
-          <a:chExt cx="0" cy="0"/>
-        </a:xfrm>
-      </p:grpSpPr>
-      <p:sp>
-        <p:nvSpPr>
-          <p:cNvPr id="2" name="Title 1"/>
-          <p:cNvSpPr>
-            <a:spLocks noGrp="1"/>
-          </p:cNvSpPr>
-          <p:nvPr>
-            <p:ph type="title"/>
-          </p:nvPr>
-        </p:nvSpPr>
-        <p:spPr/>
-        <p:txBody>
-          <a:bodyPr/>
-          <a:lstStyle/>
-          <a:p>
-            <a:r>
-              <a:rPr lang="en-US" dirty="0" smtClean="0"/>
-              <a:t>Ray Tracing System Architecture</a:t>
-            </a:r>
-            <a:endParaRPr lang="en-US" dirty="0"/>
-          </a:p>
-        </p:txBody>
-      </p:sp>
-      <p:pic>
-        <p:nvPicPr>
-          <p:cNvPr id="4" name="Picture 3" descr="Screen Shot 2014-12-02 at 3.48.45 AM.png"/>
-          <p:cNvPicPr>
-            <a:picLocks noChangeAspect="1"/>
-          </p:cNvPicPr>
-          <p:nvPr/>
-        </p:nvPicPr>
-        <p:blipFill rotWithShape="1">
-          <a:blip r:embed="rId2">
-            <a:extLst>
-              <a:ext uri="{28A0092B-C50C-407E-A947-70E740481C1C}">
-                <a14:useLocalDpi xmlns:a14="http://schemas.microsoft.com/office/drawing/2010/main" val="0"/>
-              </a:ext>
-            </a:extLst>
-          </a:blip>
-          <a:srcRect t="9259"/>
-          <a:stretch/>
-        </p:blipFill>
-        <p:spPr>
-          <a:xfrm>
-            <a:off x="1552214" y="1679222"/>
-            <a:ext cx="9437271" cy="5178778"/>
-          </a:xfrm>
-          <a:prstGeom prst="rect">
-            <a:avLst/>
-          </a:prstGeom>
-        </p:spPr>
-      </p:pic>
-    </p:spTree>
-    <p:extLst>
-      <p:ext uri="{BB962C8B-B14F-4D97-AF65-F5344CB8AC3E}">
-        <p14:creationId xmlns:p14="http://schemas.microsoft.com/office/powerpoint/2010/main" val="1980734559"/>
-      </p:ext>
-    </p:extLst>
-  </p:cSld>
-  <p:clrMapOvr>
-    <a:masterClrMapping/>
-  </p:clrMapOvr>
-</p:sld>
-</file>
-
-<file path=ppt/slides/slide3.xml><?xml version="1.0" encoding="utf-8"?>
-<p:sld xmlns:a="http://schemas.openxmlformats.org/drawingml/2006/main" xmlns:r="http://schemas.openxmlformats.org/officeDocument/2006/relationships" xmlns:p="http://schemas.openxmlformats.org/presentationml/2006/main">
-  <p:cSld>
-    <p:spTree>
-      <p:nvGrpSpPr>
-        <p:cNvPr id="1" name=""/>
-        <p:cNvGrpSpPr/>
-        <p:nvPr/>
-      </p:nvGrpSpPr>
-      <p:grpSpPr>
-        <a:xfrm>
-          <a:off x="0" y="0"/>
-          <a:ext cx="0" cy="0"/>
-          <a:chOff x="0" y="0"/>
-          <a:chExt cx="0" cy="0"/>
-        </a:xfrm>
-      </p:grpSpPr>
-      <p:sp>
-        <p:nvSpPr>
-          <p:cNvPr id="2" name="Title 1"/>
-          <p:cNvSpPr>
-            <a:spLocks noGrp="1"/>
-          </p:cNvSpPr>
-          <p:nvPr>
-            <p:ph type="title"/>
-          </p:nvPr>
-        </p:nvSpPr>
-        <p:spPr/>
-        <p:txBody>
-          <a:bodyPr/>
-          <a:lstStyle/>
-          <a:p>
-            <a:r>
-              <a:rPr lang="en-US" dirty="0" smtClean="0"/>
-              <a:t>Scan Line System </a:t>
-            </a:r>
-            <a:r>
-              <a:rPr lang="en-US" dirty="0"/>
-              <a:t>Architecture</a:t>
-            </a:r>
-          </a:p>
-        </p:txBody>
-      </p:sp>
-      <p:pic>
-        <p:nvPicPr>
-          <p:cNvPr id="4" name="Picture 3" descr="Screen Shot 2014-12-02 at 3.49.02 AM.png"/>
-          <p:cNvPicPr>
-            <a:picLocks noChangeAspect="1"/>
-          </p:cNvPicPr>
-          <p:nvPr/>
-        </p:nvPicPr>
-        <p:blipFill rotWithShape="1">
-          <a:blip r:embed="rId2">
-            <a:extLst>
-              <a:ext uri="{28A0092B-C50C-407E-A947-70E740481C1C}">
-                <a14:useLocalDpi xmlns:a14="http://schemas.microsoft.com/office/drawing/2010/main" val="0"/>
-              </a:ext>
-            </a:extLst>
-          </a:blip>
-          <a:srcRect t="6790"/>
-          <a:stretch/>
-        </p:blipFill>
-        <p:spPr>
-          <a:xfrm>
-            <a:off x="1467556" y="1721556"/>
-            <a:ext cx="9228666" cy="5136443"/>
-          </a:xfrm>
-          <a:prstGeom prst="rect">
-            <a:avLst/>
-          </a:prstGeom>
-        </p:spPr>
-      </p:pic>
-    </p:spTree>
-    <p:extLst>
-      <p:ext uri="{BB962C8B-B14F-4D97-AF65-F5344CB8AC3E}">
-        <p14:creationId xmlns:p14="http://schemas.microsoft.com/office/powerpoint/2010/main" val="1282560796"/>
-      </p:ext>
-    </p:extLst>
-  </p:cSld>
-  <p:clrMapOvr>
-    <a:masterClrMapping/>
-  </p:clrMapOvr>
-</p:sld>
-</file>
-
-<file path=ppt/slides/slide4.xml><?xml version="1.0" encoding="utf-8"?>
-<p:sld xmlns:a="http://schemas.openxmlformats.org/drawingml/2006/main" xmlns:r="http://schemas.openxmlformats.org/officeDocument/2006/relationships" xmlns:p="http://schemas.openxmlformats.org/presentationml/2006/main">
-  <p:cSld>
-    <p:spTree>
-      <p:nvGrpSpPr>
-        <p:cNvPr id="1" name=""/>
-        <p:cNvGrpSpPr/>
-        <p:nvPr/>
-      </p:nvGrpSpPr>
-      <p:grpSpPr>
-        <a:xfrm>
-          <a:off x="0" y="0"/>
-          <a:ext cx="0" cy="0"/>
-          <a:chOff x="0" y="0"/>
-          <a:chExt cx="0" cy="0"/>
-        </a:xfrm>
-      </p:grpSpPr>
-      <p:sp>
-        <p:nvSpPr>
-          <p:cNvPr id="2" name="Title 1"/>
-          <p:cNvSpPr>
-            <a:spLocks noGrp="1"/>
-          </p:cNvSpPr>
-          <p:nvPr>
-            <p:ph type="ctrTitle"/>
-          </p:nvPr>
-        </p:nvSpPr>
-        <p:spPr/>
-        <p:txBody>
-          <a:bodyPr/>
-          <a:lstStyle/>
-          <a:p>
-            <a:r>
-              <a:rPr lang="en-US" dirty="0" smtClean="0"/>
-              <a:t>Ray Tracing</a:t>
-            </a:r>
-            <a:endParaRPr lang="en-IN" dirty="0"/>
-          </a:p>
-        </p:txBody>
-      </p:sp>
-    </p:spTree>
-    <p:extLst>
-      <p:ext uri="{BB962C8B-B14F-4D97-AF65-F5344CB8AC3E}">
-        <p14:creationId xmlns:p14="http://schemas.microsoft.com/office/powerpoint/2010/main" val="3272576113"/>
-      </p:ext>
-    </p:extLst>
-  </p:cSld>
-  <p:clrMapOvr>
-    <a:masterClrMapping/>
-  </p:clrMapOvr>
-  <p:timing>
-    <p:tnLst>
-      <p:par>
-        <p:cTn xmlns:p14="http://schemas.microsoft.com/office/powerpoint/2010/main" id="1" dur="indefinite" restart="never" nodeType="tmRoot"/>
-      </p:par>
-    </p:tnLst>
-  </p:timing>
-</p:sld>
-</file>
-
-<file path=ppt/slides/slide5.xml><?xml version="1.0" encoding="utf-8"?>
-<p:sld xmlns:a="http://schemas.openxmlformats.org/drawingml/2006/main" xmlns:r="http://schemas.openxmlformats.org/officeDocument/2006/relationships" xmlns:p="http://schemas.openxmlformats.org/presentationml/2006/main">
-  <p:cSld>
-    <p:spTree>
-      <p:nvGrpSpPr>
-        <p:cNvPr id="1" name=""/>
-        <p:cNvGrpSpPr/>
-        <p:nvPr/>
-      </p:nvGrpSpPr>
-      <p:grpSpPr>
-        <a:xfrm>
-          <a:off x="0" y="0"/>
-          <a:ext cx="0" cy="0"/>
-          <a:chOff x="0" y="0"/>
-          <a:chExt cx="0" cy="0"/>
-        </a:xfrm>
-      </p:grpSpPr>
-      <p:sp>
-        <p:nvSpPr>
-          <p:cNvPr id="2" name="Title 1"/>
-          <p:cNvSpPr>
-            <a:spLocks noGrp="1"/>
-          </p:cNvSpPr>
-          <p:nvPr>
-            <p:ph type="title"/>
-          </p:nvPr>
-        </p:nvSpPr>
-        <p:spPr/>
-        <p:txBody>
-          <a:bodyPr/>
-          <a:lstStyle/>
-          <a:p>
-            <a:r>
-              <a:rPr lang="en-US" dirty="0" smtClean="0"/>
-              <a:t>Ray Tracing Implementation </a:t>
-            </a:r>
-            <a:r>
-              <a:rPr lang="en-US" dirty="0" smtClean="0"/>
-              <a:t/>
-            </a:r>
-            <a:br>
-              <a:rPr lang="en-US" dirty="0" smtClean="0"/>
-            </a:br>
-            <a:r>
-              <a:rPr lang="en-US" dirty="0" smtClean="0"/>
-              <a:t>– </a:t>
-            </a:r>
-            <a:r>
-              <a:rPr lang="en-US" dirty="0" smtClean="0"/>
-              <a:t>Eye to Object</a:t>
-            </a:r>
-            <a:endParaRPr lang="en-IN" dirty="0"/>
-          </a:p>
-        </p:txBody>
-      </p:sp>
-      <p:sp>
-        <p:nvSpPr>
-          <p:cNvPr id="3" name="Content Placeholder 2"/>
-          <p:cNvSpPr>
-            <a:spLocks noGrp="1"/>
-          </p:cNvSpPr>
-          <p:nvPr>
-            <p:ph idx="1"/>
-          </p:nvPr>
-        </p:nvSpPr>
-        <p:spPr>
-          <a:xfrm>
-            <a:off x="838200" y="1825625"/>
-            <a:ext cx="6503894" cy="4351338"/>
-          </a:xfrm>
-        </p:spPr>
-        <p:txBody>
-          <a:bodyPr>
-            <a:noAutofit/>
-          </a:bodyPr>
-          <a:lstStyle/>
-          <a:p>
-            <a:pPr marL="0" indent="0">
-              <a:buNone/>
-            </a:pPr>
-            <a:r>
-              <a:rPr lang="en-US" dirty="0" smtClean="0"/>
-              <a:t>For every pixel value </a:t>
-            </a:r>
-          </a:p>
-          <a:p>
-            <a:pPr marL="0" indent="0">
-              <a:buNone/>
-            </a:pPr>
-            <a:r>
-              <a:rPr lang="en-US" dirty="0" smtClean="0"/>
-              <a:t>- Map the pixel value to the vector space </a:t>
-            </a:r>
-          </a:p>
-          <a:p>
-            <a:pPr marL="0" indent="0">
-              <a:buNone/>
-            </a:pPr>
-            <a:r>
-              <a:rPr lang="en-US" dirty="0" smtClean="0"/>
-              <a:t>- Calculate the ray’s position and direction</a:t>
-            </a:r>
-          </a:p>
-          <a:p>
-            <a:pPr marL="0" indent="0">
-              <a:buNone/>
-            </a:pPr>
-            <a:r>
-              <a:rPr lang="en-US" dirty="0" smtClean="0"/>
-              <a:t>- Calculate the point on the ray using the rays parametric equation</a:t>
-            </a:r>
-          </a:p>
-          <a:p>
-            <a:pPr marL="0" indent="0">
-              <a:buNone/>
-            </a:pPr>
-            <a:r>
-              <a:rPr lang="en-US" dirty="0" smtClean="0"/>
-              <a:t>- For every triangle in the geometry </a:t>
-            </a:r>
-            <a:endParaRPr lang="en-US" dirty="0"/>
-          </a:p>
-        </p:txBody>
-      </p:sp>
-      <p:pic>
-        <p:nvPicPr>
-          <p:cNvPr id="4" name="Picture 3"/>
-          <p:cNvPicPr>
-            <a:picLocks noChangeAspect="1"/>
-          </p:cNvPicPr>
-          <p:nvPr/>
-        </p:nvPicPr>
-        <p:blipFill>
-          <a:blip r:embed="rId3"/>
-          <a:stretch>
-            <a:fillRect/>
-          </a:stretch>
-        </p:blipFill>
-        <p:spPr>
-          <a:xfrm>
-            <a:off x="7689756" y="2123514"/>
-            <a:ext cx="4181475" cy="3944264"/>
-          </a:xfrm>
-          <a:prstGeom prst="rect">
-            <a:avLst/>
-          </a:prstGeom>
-        </p:spPr>
-      </p:pic>
-      <p:cxnSp>
-        <p:nvCxnSpPr>
-          <p:cNvPr id="6" name="Straight Arrow Connector 5"/>
-          <p:cNvCxnSpPr/>
-          <p:nvPr/>
-        </p:nvCxnSpPr>
-        <p:spPr>
-          <a:xfrm flipV="1">
-            <a:off x="8538882" y="3442447"/>
-            <a:ext cx="0" cy="672353"/>
-          </a:xfrm>
-          <a:prstGeom prst="straightConnector1">
-            <a:avLst/>
-          </a:prstGeom>
-          <a:ln>
-            <a:tailEnd type="triangle"/>
-          </a:ln>
-        </p:spPr>
-        <p:style>
-          <a:lnRef idx="1">
-            <a:schemeClr val="accent1"/>
-          </a:lnRef>
-          <a:fillRef idx="0">
-            <a:schemeClr val="accent1"/>
-          </a:fillRef>
-          <a:effectRef idx="0">
-            <a:schemeClr val="accent1"/>
-          </a:effectRef>
-          <a:fontRef idx="minor">
-            <a:schemeClr val="tx1"/>
-          </a:fontRef>
-        </p:style>
-      </p:cxnSp>
-      <p:cxnSp>
-        <p:nvCxnSpPr>
-          <p:cNvPr id="8" name="Straight Arrow Connector 7"/>
-          <p:cNvCxnSpPr/>
-          <p:nvPr/>
-        </p:nvCxnSpPr>
-        <p:spPr>
-          <a:xfrm flipH="1">
-            <a:off x="8081682" y="4128247"/>
-            <a:ext cx="457200" cy="618565"/>
-          </a:xfrm>
-          <a:prstGeom prst="straightConnector1">
-            <a:avLst/>
-          </a:prstGeom>
-          <a:ln>
-            <a:tailEnd type="triangle"/>
-          </a:ln>
-        </p:spPr>
-        <p:style>
-          <a:lnRef idx="1">
-            <a:schemeClr val="accent1"/>
-          </a:lnRef>
-          <a:fillRef idx="0">
-            <a:schemeClr val="accent1"/>
-          </a:fillRef>
-          <a:effectRef idx="0">
-            <a:schemeClr val="accent1"/>
-          </a:effectRef>
-          <a:fontRef idx="minor">
-            <a:schemeClr val="tx1"/>
-          </a:fontRef>
-        </p:style>
-      </p:cxnSp>
-      <p:sp>
-        <p:nvSpPr>
-          <p:cNvPr id="9" name="TextBox 8"/>
-          <p:cNvSpPr txBox="1"/>
-          <p:nvPr/>
-        </p:nvSpPr>
-        <p:spPr>
-          <a:xfrm>
-            <a:off x="7788635" y="4658417"/>
-            <a:ext cx="288862" cy="369332"/>
-          </a:xfrm>
-          <a:prstGeom prst="rect">
-            <a:avLst/>
-          </a:prstGeom>
-          <a:noFill/>
-        </p:spPr>
-        <p:txBody>
-          <a:bodyPr wrap="none" rtlCol="0">
-            <a:spAutoFit/>
-          </a:bodyPr>
-          <a:lstStyle/>
-          <a:p>
-            <a:r>
-              <a:rPr lang="en-US" dirty="0"/>
-              <a:t>v</a:t>
-            </a:r>
-            <a:endParaRPr lang="en-IN" dirty="0"/>
-          </a:p>
-        </p:txBody>
-      </p:sp>
-      <p:sp>
-        <p:nvSpPr>
-          <p:cNvPr id="10" name="TextBox 9"/>
-          <p:cNvSpPr txBox="1"/>
-          <p:nvPr/>
-        </p:nvSpPr>
-        <p:spPr>
-          <a:xfrm>
-            <a:off x="8385635" y="3088704"/>
-            <a:ext cx="306494" cy="369332"/>
-          </a:xfrm>
-          <a:prstGeom prst="rect">
-            <a:avLst/>
-          </a:prstGeom>
-          <a:noFill/>
-        </p:spPr>
-        <p:txBody>
-          <a:bodyPr wrap="none" rtlCol="0">
-            <a:spAutoFit/>
-          </a:bodyPr>
-          <a:lstStyle/>
-          <a:p>
-            <a:r>
-              <a:rPr lang="en-US" dirty="0" smtClean="0"/>
-              <a:t>u</a:t>
-            </a:r>
-            <a:endParaRPr lang="en-IN" dirty="0"/>
-          </a:p>
-        </p:txBody>
-      </p:sp>
-    </p:spTree>
-    <p:extLst>
-      <p:ext uri="{BB962C8B-B14F-4D97-AF65-F5344CB8AC3E}">
-        <p14:creationId xmlns:p14="http://schemas.microsoft.com/office/powerpoint/2010/main" val="970896719"/>
-      </p:ext>
-    </p:extLst>
-  </p:cSld>
-  <p:clrMapOvr>
-    <a:masterClrMapping/>
-  </p:clrMapOvr>
-</p:sld>
-</file>
-
-<file path=ppt/slides/slide6.xml><?xml version="1.0" encoding="utf-8"?>
-<p:sld xmlns:a="http://schemas.openxmlformats.org/drawingml/2006/main" xmlns:r="http://schemas.openxmlformats.org/officeDocument/2006/relationships" xmlns:p="http://schemas.openxmlformats.org/presentationml/2006/main">
-  <p:cSld>
-    <p:spTree>
-      <p:nvGrpSpPr>
-        <p:cNvPr id="1" name=""/>
-        <p:cNvGrpSpPr/>
-        <p:nvPr/>
-      </p:nvGrpSpPr>
-      <p:grpSpPr>
-        <a:xfrm>
-          <a:off x="0" y="0"/>
-          <a:ext cx="0" cy="0"/>
-          <a:chOff x="0" y="0"/>
-          <a:chExt cx="0" cy="0"/>
-        </a:xfrm>
-      </p:grpSpPr>
-      <p:sp>
-        <p:nvSpPr>
-          <p:cNvPr id="2" name="Title 1"/>
-          <p:cNvSpPr>
-            <a:spLocks noGrp="1"/>
-          </p:cNvSpPr>
-          <p:nvPr>
-            <p:ph type="title"/>
-          </p:nvPr>
-        </p:nvSpPr>
-        <p:spPr/>
-        <p:txBody>
-          <a:bodyPr/>
-          <a:lstStyle/>
-          <a:p>
-            <a:r>
-              <a:rPr lang="en-US" dirty="0" smtClean="0"/>
-              <a:t>Ray Tracing cont’d</a:t>
-            </a:r>
-            <a:endParaRPr lang="en-US" dirty="0"/>
-          </a:p>
-        </p:txBody>
-      </p:sp>
-      <p:pic>
-        <p:nvPicPr>
-          <p:cNvPr id="4" name="Picture 3" descr="640px-Ray_trace_diagram.svg.png"/>
-          <p:cNvPicPr>
-            <a:picLocks noChangeAspect="1"/>
-          </p:cNvPicPr>
-          <p:nvPr/>
-        </p:nvPicPr>
-        <p:blipFill>
-          <a:blip r:embed="rId2">
-            <a:extLst>
-              <a:ext uri="{28A0092B-C50C-407E-A947-70E740481C1C}">
-                <a14:useLocalDpi xmlns:a14="http://schemas.microsoft.com/office/drawing/2010/main" val="0"/>
-              </a:ext>
-            </a:extLst>
-          </a:blip>
-          <a:stretch>
-            <a:fillRect/>
-          </a:stretch>
-        </p:blipFill>
-        <p:spPr>
-          <a:xfrm>
-            <a:off x="5675177" y="2029289"/>
-            <a:ext cx="6229504" cy="4146513"/>
-          </a:xfrm>
-          <a:prstGeom prst="rect">
-            <a:avLst/>
-          </a:prstGeom>
-        </p:spPr>
-      </p:pic>
-      <p:sp>
-        <p:nvSpPr>
-          <p:cNvPr id="5" name="TextBox 4"/>
-          <p:cNvSpPr txBox="1"/>
-          <p:nvPr/>
-        </p:nvSpPr>
-        <p:spPr>
-          <a:xfrm>
-            <a:off x="-26238" y="1888412"/>
-            <a:ext cx="5816316" cy="4524315"/>
-          </a:xfrm>
-          <a:prstGeom prst="rect">
-            <a:avLst/>
-          </a:prstGeom>
-          <a:noFill/>
-        </p:spPr>
-        <p:txBody>
-          <a:bodyPr wrap="none" rtlCol="0">
-            <a:spAutoFit/>
-          </a:bodyPr>
-          <a:lstStyle/>
-          <a:p>
-            <a:pPr marL="285750" indent="-285750">
-              <a:buFontTx/>
-              <a:buChar char="-"/>
-            </a:pPr>
-            <a:r>
-              <a:rPr lang="en-US" sz="2400" dirty="0" smtClean="0"/>
-              <a:t>Calculate </a:t>
-            </a:r>
-            <a:r>
-              <a:rPr lang="en-US" sz="2400" dirty="0"/>
-              <a:t>the normal and check if the </a:t>
-            </a:r>
-            <a:endParaRPr lang="en-US" sz="2400" dirty="0" smtClean="0"/>
-          </a:p>
-          <a:p>
-            <a:r>
-              <a:rPr lang="en-US" sz="2400" dirty="0"/>
-              <a:t> </a:t>
-            </a:r>
-            <a:r>
-              <a:rPr lang="en-US" sz="2400" dirty="0" smtClean="0"/>
-              <a:t>   dot </a:t>
-            </a:r>
-            <a:r>
-              <a:rPr lang="en-US" sz="2400" dirty="0"/>
-              <a:t>product </a:t>
-            </a:r>
-            <a:r>
-              <a:rPr lang="en-US" sz="2400" dirty="0" smtClean="0"/>
-              <a:t>of </a:t>
-            </a:r>
-            <a:r>
-              <a:rPr lang="en-US" sz="2400" dirty="0"/>
-              <a:t>the normal and the </a:t>
-            </a:r>
-            <a:endParaRPr lang="en-US" sz="2400" dirty="0" smtClean="0"/>
-          </a:p>
-          <a:p>
-            <a:r>
-              <a:rPr lang="en-US" sz="2400" dirty="0"/>
-              <a:t> </a:t>
-            </a:r>
-            <a:r>
-              <a:rPr lang="en-US" sz="2400" dirty="0" smtClean="0"/>
-              <a:t>   direction </a:t>
-            </a:r>
-            <a:r>
-              <a:rPr lang="en-US" sz="2400" dirty="0"/>
-              <a:t>is not equal to 0</a:t>
-            </a:r>
-          </a:p>
-          <a:p>
-            <a:pPr marL="285750" indent="-285750">
-              <a:buFontTx/>
-              <a:buChar char="-"/>
-            </a:pPr>
-            <a:r>
-              <a:rPr lang="en-US" sz="2400" dirty="0" smtClean="0"/>
-              <a:t>Calculate </a:t>
-            </a:r>
-            <a:r>
-              <a:rPr lang="en-US" sz="2400" dirty="0"/>
-              <a:t>the intersection of the ray with </a:t>
-            </a:r>
-            <a:endParaRPr lang="en-US" sz="2400" dirty="0" smtClean="0"/>
-          </a:p>
-          <a:p>
-            <a:r>
-              <a:rPr lang="en-US" sz="2400" dirty="0"/>
-              <a:t> </a:t>
-            </a:r>
-            <a:r>
-              <a:rPr lang="en-US" sz="2400" dirty="0" smtClean="0"/>
-              <a:t>   the </a:t>
-            </a:r>
-            <a:r>
-              <a:rPr lang="en-US" sz="2400" dirty="0"/>
-              <a:t>triangle </a:t>
-            </a:r>
-            <a:r>
-              <a:rPr lang="en-US" sz="2400" dirty="0" smtClean="0"/>
-              <a:t>plane </a:t>
-            </a:r>
-            <a:r>
-              <a:rPr lang="en-US" sz="2400" dirty="0"/>
-              <a:t>and check whether it is </a:t>
-            </a:r>
-            <a:endParaRPr lang="en-US" sz="2400" dirty="0" smtClean="0"/>
-          </a:p>
-          <a:p>
-            <a:r>
-              <a:rPr lang="en-US" sz="2400" dirty="0"/>
-              <a:t> </a:t>
-            </a:r>
-            <a:r>
-              <a:rPr lang="en-US" sz="2400" dirty="0" smtClean="0"/>
-              <a:t>   the </a:t>
-            </a:r>
-            <a:r>
-              <a:rPr lang="en-US" sz="2400" dirty="0"/>
-              <a:t>minimum positive </a:t>
-            </a:r>
-            <a:r>
-              <a:rPr lang="en-US" sz="2400" dirty="0" smtClean="0"/>
-              <a:t>intersection </a:t>
-            </a:r>
-            <a:r>
-              <a:rPr lang="en-US" sz="2400" dirty="0"/>
-              <a:t>and </a:t>
-            </a:r>
-            <a:endParaRPr lang="en-US" sz="2400" dirty="0" smtClean="0"/>
-          </a:p>
-          <a:p>
-            <a:r>
-              <a:rPr lang="en-US" sz="2400" dirty="0"/>
-              <a:t> </a:t>
-            </a:r>
-            <a:r>
-              <a:rPr lang="en-US" sz="2400" dirty="0" smtClean="0"/>
-              <a:t>   whether </a:t>
-            </a:r>
-            <a:r>
-              <a:rPr lang="en-US" sz="2400" dirty="0"/>
-              <a:t>the point lies inside the </a:t>
-            </a:r>
-            <a:r>
-              <a:rPr lang="en-US" sz="2400" dirty="0" smtClean="0"/>
-              <a:t>triangle </a:t>
-            </a:r>
-          </a:p>
-          <a:p>
-            <a:r>
-              <a:rPr lang="en-US" sz="2400" dirty="0"/>
-              <a:t> </a:t>
-            </a:r>
-            <a:r>
-              <a:rPr lang="en-US" sz="2400" dirty="0" smtClean="0"/>
-              <a:t>   or not.</a:t>
-            </a:r>
-            <a:endParaRPr lang="en-US" sz="2400" dirty="0"/>
-          </a:p>
-          <a:p>
-            <a:pPr marL="342900" indent="-342900">
-              <a:buFontTx/>
-              <a:buChar char="-"/>
-            </a:pPr>
-            <a:r>
-              <a:rPr lang="en-US" sz="2400" dirty="0" smtClean="0"/>
-              <a:t>For </a:t>
-            </a:r>
-            <a:r>
-              <a:rPr lang="en-US" sz="2400" dirty="0"/>
-              <a:t>the minimum intersection value that </a:t>
-            </a:r>
-            <a:endParaRPr lang="en-US" sz="2400" dirty="0" smtClean="0"/>
-          </a:p>
-          <a:p>
-            <a:r>
-              <a:rPr lang="en-US" sz="2400" dirty="0"/>
-              <a:t> </a:t>
-            </a:r>
-            <a:r>
-              <a:rPr lang="en-US" sz="2400" dirty="0" smtClean="0"/>
-              <a:t>   lies within </a:t>
-            </a:r>
-            <a:r>
-              <a:rPr lang="en-US" sz="2400" dirty="0"/>
-              <a:t>the </a:t>
-            </a:r>
-            <a:r>
-              <a:rPr lang="en-US" sz="2400" dirty="0" smtClean="0"/>
-              <a:t>triangle </a:t>
-            </a:r>
-            <a:r>
-              <a:rPr lang="en-US" sz="2400" dirty="0"/>
-              <a:t>we compute the </a:t>
-            </a:r>
-            <a:endParaRPr lang="en-US" sz="2400" dirty="0" smtClean="0"/>
-          </a:p>
-          <a:p>
-            <a:r>
-              <a:rPr lang="en-US" sz="2400" dirty="0"/>
-              <a:t> </a:t>
-            </a:r>
-            <a:r>
-              <a:rPr lang="en-US" sz="2400" dirty="0" smtClean="0"/>
-              <a:t>   color </a:t>
-            </a:r>
-            <a:r>
-              <a:rPr lang="en-US" sz="2400" dirty="0"/>
-              <a:t>of </a:t>
-            </a:r>
-            <a:r>
-              <a:rPr lang="en-US" sz="2400" dirty="0" smtClean="0"/>
-              <a:t>that pixel.</a:t>
-            </a:r>
-            <a:endParaRPr lang="en-IN" sz="2400" dirty="0"/>
-          </a:p>
-          <a:p>
-            <a:endParaRPr lang="en-US" sz="2400" dirty="0"/>
-          </a:p>
-        </p:txBody>
-      </p:sp>
-    </p:spTree>
-    <p:extLst>
-      <p:ext uri="{BB962C8B-B14F-4D97-AF65-F5344CB8AC3E}">
-        <p14:creationId xmlns:p14="http://schemas.microsoft.com/office/powerpoint/2010/main" val="337465257"/>
-      </p:ext>
-    </p:extLst>
-  </p:cSld>
-  <p:clrMapOvr>
-    <a:masterClrMapping/>
-  </p:clrMapOvr>
-</p:sld>
-</file>
-
-<file path=ppt/slides/slide7.xml><?xml version="1.0" encoding="utf-8"?>
-<p:sld xmlns:a="http://schemas.openxmlformats.org/drawingml/2006/main" xmlns:r="http://schemas.openxmlformats.org/officeDocument/2006/relationships" xmlns:p="http://schemas.openxmlformats.org/presentationml/2006/main">
-  <p:cSld>
-    <p:spTree>
-      <p:nvGrpSpPr>
-        <p:cNvPr id="1" name=""/>
-        <p:cNvGrpSpPr/>
-        <p:nvPr/>
-      </p:nvGrpSpPr>
-      <p:grpSpPr>
-        <a:xfrm>
-          <a:off x="0" y="0"/>
-          <a:ext cx="0" cy="0"/>
-          <a:chOff x="0" y="0"/>
-          <a:chExt cx="0" cy="0"/>
-        </a:xfrm>
-      </p:grpSpPr>
-      <p:sp>
-        <p:nvSpPr>
-          <p:cNvPr id="2" name="Title 1"/>
-          <p:cNvSpPr>
-            <a:spLocks noGrp="1"/>
-          </p:cNvSpPr>
-          <p:nvPr>
-            <p:ph type="ctrTitle"/>
-          </p:nvPr>
-        </p:nvSpPr>
-        <p:spPr/>
-        <p:txBody>
-          <a:bodyPr/>
-          <a:lstStyle/>
-          <a:p>
-            <a:r>
-              <a:rPr lang="en-US" dirty="0" smtClean="0"/>
-              <a:t>Volumetric Shadow Rendering</a:t>
-            </a:r>
-            <a:endParaRPr lang="en-IN" dirty="0"/>
-          </a:p>
-        </p:txBody>
-      </p:sp>
-    </p:spTree>
-    <p:extLst>
-      <p:ext uri="{BB962C8B-B14F-4D97-AF65-F5344CB8AC3E}">
-        <p14:creationId xmlns:p14="http://schemas.microsoft.com/office/powerpoint/2010/main" val="438057298"/>
-      </p:ext>
-    </p:extLst>
-  </p:cSld>
-  <p:clrMapOvr>
-    <a:masterClrMapping/>
-  </p:clrMapOvr>
-</p:sld>
-</file>
-
-<file path=ppt/slides/slide8.xml><?xml version="1.0" encoding="utf-8"?>
-<p:sld xmlns:a="http://schemas.openxmlformats.org/drawingml/2006/main" xmlns:r="http://schemas.openxmlformats.org/officeDocument/2006/relationships" xmlns:p="http://schemas.openxmlformats.org/presentationml/2006/main">
-  <p:cSld>
-    <p:spTree>
-      <p:nvGrpSpPr>
-        <p:cNvPr id="1" name=""/>
-        <p:cNvGrpSpPr/>
-        <p:nvPr/>
-      </p:nvGrpSpPr>
-      <p:grpSpPr>
-        <a:xfrm>
-          <a:off x="0" y="0"/>
-          <a:ext cx="0" cy="0"/>
-          <a:chOff x="0" y="0"/>
-          <a:chExt cx="0" cy="0"/>
-        </a:xfrm>
-      </p:grpSpPr>
       <p:sp>
         <p:nvSpPr>
           <p:cNvPr id="2" name="Title 1"/>
@@ -8758,7 +7619,7 @@
 </p:sld>
 </file>
 
-<file path=ppt/slides/slide9.xml><?xml version="1.0" encoding="utf-8"?>
+<file path=ppt/slides/slide11.xml><?xml version="1.0" encoding="utf-8"?>
 <p:sld xmlns:a="http://schemas.openxmlformats.org/drawingml/2006/main" xmlns:r="http://schemas.openxmlformats.org/officeDocument/2006/relationships" xmlns:p="http://schemas.openxmlformats.org/presentationml/2006/main">
   <p:cSld>
     <p:spTree>
@@ -9019,7 +7880,7 @@
   <p:timing>
     <p:tnLst>
       <p:par>
-        <p:cTn xmlns:p14="http://schemas.microsoft.com/office/powerpoint/2010/main" id="1" dur="indefinite" nodeType="tmRoot">
+        <p:cTn xmlns:p14="http://schemas.microsoft.com/office/powerpoint/2010/main" id="1" dur="indefinite" restart="never" nodeType="tmRoot">
           <p:childTnLst>
             <p:seq concurrent="1" nextAc="seek">
               <p:cTn id="2" dur="0" nodeType="mainSeq"/>
@@ -9043,6 +7904,1509 @@
       </p:par>
     </p:tnLst>
   </p:timing>
+</p:sld>
+</file>
+
+<file path=ppt/slides/slide12.xml><?xml version="1.0" encoding="utf-8"?>
+<p:sld xmlns:a="http://schemas.openxmlformats.org/drawingml/2006/main" xmlns:r="http://schemas.openxmlformats.org/officeDocument/2006/relationships" xmlns:p="http://schemas.openxmlformats.org/presentationml/2006/main">
+  <p:cSld>
+    <p:spTree>
+      <p:nvGrpSpPr>
+        <p:cNvPr id="1" name=""/>
+        <p:cNvGrpSpPr/>
+        <p:nvPr/>
+      </p:nvGrpSpPr>
+      <p:grpSpPr>
+        <a:xfrm>
+          <a:off x="0" y="0"/>
+          <a:ext cx="0" cy="0"/>
+          <a:chOff x="0" y="0"/>
+          <a:chExt cx="0" cy="0"/>
+        </a:xfrm>
+      </p:grpSpPr>
+      <p:pic>
+        <p:nvPicPr>
+          <p:cNvPr id="5" name="Picture 4" descr="single_leaf_shadow_volume_for_ppt.png"/>
+          <p:cNvPicPr>
+            <a:picLocks noChangeAspect="1"/>
+          </p:cNvPicPr>
+          <p:nvPr/>
+        </p:nvPicPr>
+        <p:blipFill>
+          <a:blip r:embed="rId2">
+            <a:extLst>
+              <a:ext uri="{28A0092B-C50C-407E-A947-70E740481C1C}">
+                <a14:useLocalDpi xmlns:a14="http://schemas.microsoft.com/office/drawing/2010/main" val="0"/>
+              </a:ext>
+            </a:extLst>
+          </a:blip>
+          <a:stretch>
+            <a:fillRect/>
+          </a:stretch>
+        </p:blipFill>
+        <p:spPr>
+          <a:xfrm>
+            <a:off x="6594120" y="1766705"/>
+            <a:ext cx="4895850" cy="4876800"/>
+          </a:xfrm>
+          <a:prstGeom prst="rect">
+            <a:avLst/>
+          </a:prstGeom>
+        </p:spPr>
+      </p:pic>
+      <p:sp>
+        <p:nvSpPr>
+          <p:cNvPr id="6" name="TextBox 5"/>
+          <p:cNvSpPr txBox="1"/>
+          <p:nvPr/>
+        </p:nvSpPr>
+        <p:spPr>
+          <a:xfrm>
+            <a:off x="2794000" y="804336"/>
+            <a:ext cx="6929977" cy="646331"/>
+          </a:xfrm>
+          <a:prstGeom prst="rect">
+            <a:avLst/>
+          </a:prstGeom>
+          <a:noFill/>
+        </p:spPr>
+        <p:txBody>
+          <a:bodyPr wrap="none" rtlCol="0">
+            <a:spAutoFit/>
+          </a:bodyPr>
+          <a:lstStyle/>
+          <a:p>
+            <a:r>
+              <a:rPr lang="en-US" sz="3600" dirty="0" smtClean="0"/>
+              <a:t>How the Shadow Volume Grows ?</a:t>
+            </a:r>
+            <a:endParaRPr lang="en-US" sz="3600" dirty="0"/>
+          </a:p>
+        </p:txBody>
+      </p:sp>
+      <p:sp>
+        <p:nvSpPr>
+          <p:cNvPr id="7" name="TextBox 6"/>
+          <p:cNvSpPr txBox="1"/>
+          <p:nvPr/>
+        </p:nvSpPr>
+        <p:spPr>
+          <a:xfrm>
+            <a:off x="635000" y="1834444"/>
+            <a:ext cx="5941350" cy="4524315"/>
+          </a:xfrm>
+          <a:prstGeom prst="rect">
+            <a:avLst/>
+          </a:prstGeom>
+          <a:noFill/>
+        </p:spPr>
+        <p:txBody>
+          <a:bodyPr wrap="none" rtlCol="0">
+            <a:spAutoFit/>
+          </a:bodyPr>
+          <a:lstStyle/>
+          <a:p>
+            <a:r>
+              <a:rPr lang="en-US" sz="2400" dirty="0" smtClean="0"/>
+              <a:t>Previous slide showed a compactly spaced </a:t>
+            </a:r>
+          </a:p>
+          <a:p>
+            <a:r>
+              <a:rPr lang="en-US" sz="2400" dirty="0" smtClean="0"/>
+              <a:t>Shadow Volume.</a:t>
+            </a:r>
+          </a:p>
+          <a:p>
+            <a:endParaRPr lang="en-US" sz="2400" dirty="0"/>
+          </a:p>
+          <a:p>
+            <a:r>
+              <a:rPr lang="en-US" sz="2400" dirty="0" smtClean="0"/>
+              <a:t>The figure along side gives a better </a:t>
+            </a:r>
+          </a:p>
+          <a:p>
+            <a:r>
+              <a:rPr lang="en-US" sz="2400" dirty="0" smtClean="0"/>
+              <a:t>understanding of the consideration of </a:t>
+            </a:r>
+          </a:p>
+          <a:p>
+            <a:r>
+              <a:rPr lang="en-US" sz="2400" dirty="0" smtClean="0"/>
+              <a:t>multiple plane usage for shadow</a:t>
+            </a:r>
+          </a:p>
+          <a:p>
+            <a:r>
+              <a:rPr lang="en-US" sz="2400" dirty="0" smtClean="0"/>
+              <a:t>Rendering.</a:t>
+            </a:r>
+          </a:p>
+          <a:p>
+            <a:endParaRPr lang="en-US" sz="2400" dirty="0"/>
+          </a:p>
+          <a:p>
+            <a:r>
+              <a:rPr lang="en-US" sz="2400" dirty="0" smtClean="0"/>
+              <a:t>As the distance from the object increases the </a:t>
+            </a:r>
+          </a:p>
+          <a:p>
+            <a:r>
+              <a:rPr lang="en-US" sz="2400" dirty="0" smtClean="0"/>
+              <a:t>Shadow </a:t>
+            </a:r>
+            <a:r>
+              <a:rPr lang="en-US" sz="2400" dirty="0"/>
+              <a:t>b</a:t>
+            </a:r>
+            <a:r>
+              <a:rPr lang="en-US" sz="2400" dirty="0" smtClean="0"/>
+              <a:t>ecomes larger and fades out. The </a:t>
+            </a:r>
+          </a:p>
+          <a:p>
+            <a:r>
+              <a:rPr lang="en-US" sz="2400" dirty="0" smtClean="0"/>
+              <a:t>shadow plan here is sparsely spaced. Hence </a:t>
+            </a:r>
+          </a:p>
+          <a:p>
+            <a:r>
+              <a:rPr lang="en-US" sz="2400" dirty="0" smtClean="0"/>
+              <a:t>the </a:t>
+            </a:r>
+            <a:r>
+              <a:rPr lang="en-US" sz="2400" dirty="0" err="1" smtClean="0"/>
+              <a:t>glitchy</a:t>
+            </a:r>
+            <a:r>
+              <a:rPr lang="en-US" sz="2400" dirty="0" smtClean="0"/>
+              <a:t> spaced shadow volume render.</a:t>
+            </a:r>
+            <a:endParaRPr lang="en-US" sz="2400" dirty="0"/>
+          </a:p>
+        </p:txBody>
+      </p:sp>
+    </p:spTree>
+    <p:extLst>
+      <p:ext uri="{BB962C8B-B14F-4D97-AF65-F5344CB8AC3E}">
+        <p14:creationId xmlns:p14="http://schemas.microsoft.com/office/powerpoint/2010/main" val="3425757638"/>
+      </p:ext>
+    </p:extLst>
+  </p:cSld>
+  <p:clrMapOvr>
+    <a:masterClrMapping/>
+  </p:clrMapOvr>
+</p:sld>
+</file>
+
+<file path=ppt/slides/slide13.xml><?xml version="1.0" encoding="utf-8"?>
+<p:sld xmlns:a="http://schemas.openxmlformats.org/drawingml/2006/main" xmlns:r="http://schemas.openxmlformats.org/officeDocument/2006/relationships" xmlns:p="http://schemas.openxmlformats.org/presentationml/2006/main">
+  <p:cSld>
+    <p:spTree>
+      <p:nvGrpSpPr>
+        <p:cNvPr id="1" name=""/>
+        <p:cNvGrpSpPr/>
+        <p:nvPr/>
+      </p:nvGrpSpPr>
+      <p:grpSpPr>
+        <a:xfrm>
+          <a:off x="0" y="0"/>
+          <a:ext cx="0" cy="0"/>
+          <a:chOff x="0" y="0"/>
+          <a:chExt cx="0" cy="0"/>
+        </a:xfrm>
+      </p:grpSpPr>
+      <p:sp>
+        <p:nvSpPr>
+          <p:cNvPr id="2" name="Title 1"/>
+          <p:cNvSpPr>
+            <a:spLocks noGrp="1"/>
+          </p:cNvSpPr>
+          <p:nvPr>
+            <p:ph type="title"/>
+          </p:nvPr>
+        </p:nvSpPr>
+        <p:spPr/>
+        <p:txBody>
+          <a:bodyPr/>
+          <a:lstStyle/>
+          <a:p>
+            <a:r>
+              <a:rPr lang="en-US" dirty="0" smtClean="0"/>
+              <a:t>Challenges</a:t>
+            </a:r>
+            <a:endParaRPr lang="en-US" dirty="0"/>
+          </a:p>
+        </p:txBody>
+      </p:sp>
+      <p:sp>
+        <p:nvSpPr>
+          <p:cNvPr id="3" name="Content Placeholder 2"/>
+          <p:cNvSpPr>
+            <a:spLocks noGrp="1"/>
+          </p:cNvSpPr>
+          <p:nvPr>
+            <p:ph idx="1"/>
+          </p:nvPr>
+        </p:nvSpPr>
+        <p:spPr/>
+        <p:txBody>
+          <a:bodyPr/>
+          <a:lstStyle/>
+          <a:p>
+            <a:r>
+              <a:rPr lang="en-US" dirty="0" smtClean="0"/>
+              <a:t>Ray Tracing calculations. More the number of lights more the computational complexity.</a:t>
+            </a:r>
+          </a:p>
+          <a:p>
+            <a:r>
+              <a:rPr lang="en-US" dirty="0" smtClean="0"/>
+              <a:t>Each pixel is accounted for all the geometry present in the object space.</a:t>
+            </a:r>
+          </a:p>
+          <a:p>
+            <a:r>
+              <a:rPr lang="en-US" dirty="0" smtClean="0"/>
+              <a:t>Visualization of every object in the object space in contrast to the image space</a:t>
+            </a:r>
+          </a:p>
+          <a:p>
+            <a:r>
+              <a:rPr lang="en-US" dirty="0" smtClean="0"/>
+              <a:t>Light positions to get shadow volume rendering.</a:t>
+            </a:r>
+          </a:p>
+          <a:p>
+            <a:r>
+              <a:rPr lang="en-US" dirty="0" smtClean="0"/>
+              <a:t>Separate ray equations per intermediate shadow plane led to increased computational complexity and time complexity.</a:t>
+            </a:r>
+            <a:endParaRPr lang="en-US" dirty="0"/>
+          </a:p>
+        </p:txBody>
+      </p:sp>
+    </p:spTree>
+    <p:extLst>
+      <p:ext uri="{BB962C8B-B14F-4D97-AF65-F5344CB8AC3E}">
+        <p14:creationId xmlns:p14="http://schemas.microsoft.com/office/powerpoint/2010/main" val="1489819735"/>
+      </p:ext>
+    </p:extLst>
+  </p:cSld>
+  <p:clrMapOvr>
+    <a:masterClrMapping/>
+  </p:clrMapOvr>
+</p:sld>
+</file>
+
+<file path=ppt/slides/slide14.xml><?xml version="1.0" encoding="utf-8"?>
+<p:sld xmlns:a="http://schemas.openxmlformats.org/drawingml/2006/main" xmlns:r="http://schemas.openxmlformats.org/officeDocument/2006/relationships" xmlns:p="http://schemas.openxmlformats.org/presentationml/2006/main">
+  <p:cSld>
+    <p:spTree>
+      <p:nvGrpSpPr>
+        <p:cNvPr id="1" name=""/>
+        <p:cNvGrpSpPr/>
+        <p:nvPr/>
+      </p:nvGrpSpPr>
+      <p:grpSpPr>
+        <a:xfrm>
+          <a:off x="0" y="0"/>
+          <a:ext cx="0" cy="0"/>
+          <a:chOff x="0" y="0"/>
+          <a:chExt cx="0" cy="0"/>
+        </a:xfrm>
+      </p:grpSpPr>
+      <p:sp>
+        <p:nvSpPr>
+          <p:cNvPr id="2" name="Title 1"/>
+          <p:cNvSpPr>
+            <a:spLocks noGrp="1"/>
+          </p:cNvSpPr>
+          <p:nvPr>
+            <p:ph type="title"/>
+          </p:nvPr>
+        </p:nvSpPr>
+        <p:spPr/>
+        <p:txBody>
+          <a:bodyPr/>
+          <a:lstStyle/>
+          <a:p>
+            <a:r>
+              <a:rPr lang="en-US" dirty="0" smtClean="0"/>
+              <a:t>Possible solutions</a:t>
+            </a:r>
+            <a:endParaRPr lang="en-US" dirty="0"/>
+          </a:p>
+        </p:txBody>
+      </p:sp>
+      <p:sp>
+        <p:nvSpPr>
+          <p:cNvPr id="3" name="Content Placeholder 2"/>
+          <p:cNvSpPr>
+            <a:spLocks noGrp="1"/>
+          </p:cNvSpPr>
+          <p:nvPr>
+            <p:ph idx="1"/>
+          </p:nvPr>
+        </p:nvSpPr>
+        <p:spPr/>
+        <p:txBody>
+          <a:bodyPr/>
+          <a:lstStyle/>
+          <a:p>
+            <a:r>
+              <a:rPr lang="en-US" dirty="0" smtClean="0"/>
+              <a:t>Multi threaded application to reduce computation time.</a:t>
+            </a:r>
+          </a:p>
+          <a:p>
+            <a:r>
+              <a:rPr lang="en-US" dirty="0" smtClean="0"/>
+              <a:t>Application dependent selection of ray equation per ‘n x n’ pixel where n can be any positive number.</a:t>
+            </a:r>
+          </a:p>
+          <a:p>
+            <a:r>
+              <a:rPr lang="en-US" dirty="0" smtClean="0"/>
+              <a:t>Again the project was done without using any external libraries which accounts for a slow renderer. Use of external libraries can considerably reduce the time complexity.</a:t>
+            </a:r>
+          </a:p>
+          <a:p>
+            <a:pPr marL="0" indent="0">
+              <a:buNone/>
+            </a:pPr>
+            <a:endParaRPr lang="en-US" dirty="0"/>
+          </a:p>
+        </p:txBody>
+      </p:sp>
+    </p:spTree>
+    <p:extLst>
+      <p:ext uri="{BB962C8B-B14F-4D97-AF65-F5344CB8AC3E}">
+        <p14:creationId xmlns:p14="http://schemas.microsoft.com/office/powerpoint/2010/main" val="793329396"/>
+      </p:ext>
+    </p:extLst>
+  </p:cSld>
+  <p:clrMapOvr>
+    <a:masterClrMapping/>
+  </p:clrMapOvr>
+</p:sld>
+</file>
+
+<file path=ppt/slides/slide15.xml><?xml version="1.0" encoding="utf-8"?>
+<p:sld xmlns:a="http://schemas.openxmlformats.org/drawingml/2006/main" xmlns:r="http://schemas.openxmlformats.org/officeDocument/2006/relationships" xmlns:p="http://schemas.openxmlformats.org/presentationml/2006/main">
+  <p:cSld>
+    <p:spTree>
+      <p:nvGrpSpPr>
+        <p:cNvPr id="1" name=""/>
+        <p:cNvGrpSpPr/>
+        <p:nvPr/>
+      </p:nvGrpSpPr>
+      <p:grpSpPr>
+        <a:xfrm>
+          <a:off x="0" y="0"/>
+          <a:ext cx="0" cy="0"/>
+          <a:chOff x="0" y="0"/>
+          <a:chExt cx="0" cy="0"/>
+        </a:xfrm>
+      </p:grpSpPr>
+      <p:pic>
+        <p:nvPicPr>
+          <p:cNvPr id="4" name="Picture 3" descr="Contact-Thank-You-Slides_C0076_059_c01_l.png"/>
+          <p:cNvPicPr>
+            <a:picLocks noChangeAspect="1"/>
+          </p:cNvPicPr>
+          <p:nvPr/>
+        </p:nvPicPr>
+        <p:blipFill>
+          <a:blip r:embed="rId2">
+            <a:extLst>
+              <a:ext uri="{28A0092B-C50C-407E-A947-70E740481C1C}">
+                <a14:useLocalDpi xmlns:a14="http://schemas.microsoft.com/office/drawing/2010/main" val="0"/>
+              </a:ext>
+            </a:extLst>
+          </a:blip>
+          <a:stretch>
+            <a:fillRect/>
+          </a:stretch>
+        </p:blipFill>
+        <p:spPr>
+          <a:xfrm>
+            <a:off x="366889" y="306917"/>
+            <a:ext cx="11514667" cy="6297083"/>
+          </a:xfrm>
+          <a:prstGeom prst="rect">
+            <a:avLst/>
+          </a:prstGeom>
+        </p:spPr>
+      </p:pic>
+    </p:spTree>
+    <p:extLst>
+      <p:ext uri="{BB962C8B-B14F-4D97-AF65-F5344CB8AC3E}">
+        <p14:creationId xmlns:p14="http://schemas.microsoft.com/office/powerpoint/2010/main" val="3471885546"/>
+      </p:ext>
+    </p:extLst>
+  </p:cSld>
+  <p:clrMapOvr>
+    <a:masterClrMapping/>
+  </p:clrMapOvr>
+</p:sld>
+</file>
+
+<file path=ppt/slides/slide2.xml><?xml version="1.0" encoding="utf-8"?>
+<p:sld xmlns:a="http://schemas.openxmlformats.org/drawingml/2006/main" xmlns:r="http://schemas.openxmlformats.org/officeDocument/2006/relationships" xmlns:p="http://schemas.openxmlformats.org/presentationml/2006/main">
+  <p:cSld>
+    <p:spTree>
+      <p:nvGrpSpPr>
+        <p:cNvPr id="1" name=""/>
+        <p:cNvGrpSpPr/>
+        <p:nvPr/>
+      </p:nvGrpSpPr>
+      <p:grpSpPr>
+        <a:xfrm>
+          <a:off x="0" y="0"/>
+          <a:ext cx="0" cy="0"/>
+          <a:chOff x="0" y="0"/>
+          <a:chExt cx="0" cy="0"/>
+        </a:xfrm>
+      </p:grpSpPr>
+      <p:sp>
+        <p:nvSpPr>
+          <p:cNvPr id="2" name="Title 1"/>
+          <p:cNvSpPr>
+            <a:spLocks noGrp="1"/>
+          </p:cNvSpPr>
+          <p:nvPr>
+            <p:ph type="title"/>
+          </p:nvPr>
+        </p:nvSpPr>
+        <p:spPr/>
+        <p:txBody>
+          <a:bodyPr/>
+          <a:lstStyle/>
+          <a:p>
+            <a:r>
+              <a:rPr lang="en-US" dirty="0" smtClean="0"/>
+              <a:t>Brief about the title of our project</a:t>
+            </a:r>
+            <a:endParaRPr lang="en-US" dirty="0"/>
+          </a:p>
+        </p:txBody>
+      </p:sp>
+      <p:sp>
+        <p:nvSpPr>
+          <p:cNvPr id="3" name="Content Placeholder 2"/>
+          <p:cNvSpPr>
+            <a:spLocks noGrp="1"/>
+          </p:cNvSpPr>
+          <p:nvPr>
+            <p:ph idx="1"/>
+          </p:nvPr>
+        </p:nvSpPr>
+        <p:spPr/>
+        <p:txBody>
+          <a:bodyPr/>
+          <a:lstStyle/>
+          <a:p>
+            <a:r>
+              <a:rPr lang="en-US" dirty="0" smtClean="0"/>
+              <a:t>Crepuscular rays are sun rays radiating from a point in the sky where the sun is located. </a:t>
+            </a:r>
+          </a:p>
+          <a:p>
+            <a:r>
+              <a:rPr lang="en-US" dirty="0" smtClean="0"/>
+              <a:t>Crepuscular as they occur during the crepuscular hours i.e. dawn and dusk.</a:t>
+            </a:r>
+          </a:p>
+          <a:p>
+            <a:r>
+              <a:rPr lang="en-US" dirty="0" err="1" smtClean="0"/>
+              <a:t>Inspite</a:t>
+            </a:r>
+            <a:r>
+              <a:rPr lang="en-US" dirty="0" smtClean="0"/>
+              <a:t> of its converging appearance they are merely parallel and apparently appear to converge owing to perspective effect.</a:t>
+            </a:r>
+          </a:p>
+          <a:p>
+            <a:r>
+              <a:rPr lang="en-US" dirty="0" smtClean="0"/>
+              <a:t>Ray Tracing for leaves, shadow rays for volumetric shadow calculation, procedural texture (Julia Set) for sun, LEE’s scan line algorithm for tree.</a:t>
+            </a:r>
+            <a:endParaRPr lang="en-US" dirty="0"/>
+          </a:p>
+        </p:txBody>
+      </p:sp>
+    </p:spTree>
+    <p:extLst>
+      <p:ext uri="{BB962C8B-B14F-4D97-AF65-F5344CB8AC3E}">
+        <p14:creationId xmlns:p14="http://schemas.microsoft.com/office/powerpoint/2010/main" val="1921747910"/>
+      </p:ext>
+    </p:extLst>
+  </p:cSld>
+  <p:clrMapOvr>
+    <a:masterClrMapping/>
+  </p:clrMapOvr>
+</p:sld>
+</file>
+
+<file path=ppt/slides/slide3.xml><?xml version="1.0" encoding="utf-8"?>
+<p:sld xmlns:a="http://schemas.openxmlformats.org/drawingml/2006/main" xmlns:r="http://schemas.openxmlformats.org/officeDocument/2006/relationships" xmlns:p="http://schemas.openxmlformats.org/presentationml/2006/main">
+  <p:cSld>
+    <p:spTree>
+      <p:nvGrpSpPr>
+        <p:cNvPr id="1" name=""/>
+        <p:cNvGrpSpPr/>
+        <p:nvPr/>
+      </p:nvGrpSpPr>
+      <p:grpSpPr>
+        <a:xfrm>
+          <a:off x="0" y="0"/>
+          <a:ext cx="0" cy="0"/>
+          <a:chOff x="0" y="0"/>
+          <a:chExt cx="0" cy="0"/>
+        </a:xfrm>
+      </p:grpSpPr>
+      <p:sp>
+        <p:nvSpPr>
+          <p:cNvPr id="2" name="Title 1"/>
+          <p:cNvSpPr>
+            <a:spLocks noGrp="1"/>
+          </p:cNvSpPr>
+          <p:nvPr>
+            <p:ph type="title"/>
+          </p:nvPr>
+        </p:nvSpPr>
+        <p:spPr/>
+        <p:txBody>
+          <a:bodyPr/>
+          <a:lstStyle/>
+          <a:p>
+            <a:r>
+              <a:rPr lang="en-US" dirty="0" smtClean="0"/>
+              <a:t>Ray Tracing System Architecture</a:t>
+            </a:r>
+            <a:endParaRPr lang="en-US" dirty="0"/>
+          </a:p>
+        </p:txBody>
+      </p:sp>
+      <p:pic>
+        <p:nvPicPr>
+          <p:cNvPr id="3" name="Picture 2" descr="Screen Shot 2014-12-02 at 1.26.23 PM.png"/>
+          <p:cNvPicPr>
+            <a:picLocks noChangeAspect="1"/>
+          </p:cNvPicPr>
+          <p:nvPr/>
+        </p:nvPicPr>
+        <p:blipFill rotWithShape="1">
+          <a:blip r:embed="rId2">
+            <a:extLst>
+              <a:ext uri="{28A0092B-C50C-407E-A947-70E740481C1C}">
+                <a14:useLocalDpi xmlns:a14="http://schemas.microsoft.com/office/drawing/2010/main" val="0"/>
+              </a:ext>
+            </a:extLst>
+          </a:blip>
+          <a:srcRect t="7902"/>
+          <a:stretch/>
+        </p:blipFill>
+        <p:spPr>
+          <a:xfrm>
+            <a:off x="550334" y="1679222"/>
+            <a:ext cx="10879666" cy="5178777"/>
+          </a:xfrm>
+          <a:prstGeom prst="rect">
+            <a:avLst/>
+          </a:prstGeom>
+        </p:spPr>
+      </p:pic>
+    </p:spTree>
+    <p:extLst>
+      <p:ext uri="{BB962C8B-B14F-4D97-AF65-F5344CB8AC3E}">
+        <p14:creationId xmlns:p14="http://schemas.microsoft.com/office/powerpoint/2010/main" val="1980734559"/>
+      </p:ext>
+    </p:extLst>
+  </p:cSld>
+  <p:clrMapOvr>
+    <a:masterClrMapping/>
+  </p:clrMapOvr>
+</p:sld>
+</file>
+
+<file path=ppt/slides/slide4.xml><?xml version="1.0" encoding="utf-8"?>
+<p:sld xmlns:a="http://schemas.openxmlformats.org/drawingml/2006/main" xmlns:r="http://schemas.openxmlformats.org/officeDocument/2006/relationships" xmlns:p="http://schemas.openxmlformats.org/presentationml/2006/main">
+  <p:cSld>
+    <p:spTree>
+      <p:nvGrpSpPr>
+        <p:cNvPr id="1" name=""/>
+        <p:cNvGrpSpPr/>
+        <p:nvPr/>
+      </p:nvGrpSpPr>
+      <p:grpSpPr>
+        <a:xfrm>
+          <a:off x="0" y="0"/>
+          <a:ext cx="0" cy="0"/>
+          <a:chOff x="0" y="0"/>
+          <a:chExt cx="0" cy="0"/>
+        </a:xfrm>
+      </p:grpSpPr>
+      <p:sp>
+        <p:nvSpPr>
+          <p:cNvPr id="2" name="Title 1"/>
+          <p:cNvSpPr>
+            <a:spLocks noGrp="1"/>
+          </p:cNvSpPr>
+          <p:nvPr>
+            <p:ph type="title"/>
+          </p:nvPr>
+        </p:nvSpPr>
+        <p:spPr/>
+        <p:txBody>
+          <a:bodyPr/>
+          <a:lstStyle/>
+          <a:p>
+            <a:r>
+              <a:rPr lang="en-US" dirty="0" smtClean="0"/>
+              <a:t>Volumetric Shadow block</a:t>
+            </a:r>
+            <a:endParaRPr lang="en-US" dirty="0"/>
+          </a:p>
+        </p:txBody>
+      </p:sp>
+      <p:pic>
+        <p:nvPicPr>
+          <p:cNvPr id="4" name="Picture 3" descr="Screen Shot 2014-12-02 at 1.26.38 PM.png"/>
+          <p:cNvPicPr>
+            <a:picLocks noChangeAspect="1"/>
+          </p:cNvPicPr>
+          <p:nvPr/>
+        </p:nvPicPr>
+        <p:blipFill>
+          <a:blip r:embed="rId2">
+            <a:extLst>
+              <a:ext uri="{28A0092B-C50C-407E-A947-70E740481C1C}">
+                <a14:useLocalDpi xmlns:a14="http://schemas.microsoft.com/office/drawing/2010/main" val="0"/>
+              </a:ext>
+            </a:extLst>
+          </a:blip>
+          <a:stretch>
+            <a:fillRect/>
+          </a:stretch>
+        </p:blipFill>
+        <p:spPr>
+          <a:xfrm>
+            <a:off x="1073856" y="1800578"/>
+            <a:ext cx="9931400" cy="4724400"/>
+          </a:xfrm>
+          <a:prstGeom prst="rect">
+            <a:avLst/>
+          </a:prstGeom>
+        </p:spPr>
+      </p:pic>
+    </p:spTree>
+    <p:extLst>
+      <p:ext uri="{BB962C8B-B14F-4D97-AF65-F5344CB8AC3E}">
+        <p14:creationId xmlns:p14="http://schemas.microsoft.com/office/powerpoint/2010/main" val="908011301"/>
+      </p:ext>
+    </p:extLst>
+  </p:cSld>
+  <p:clrMapOvr>
+    <a:masterClrMapping/>
+  </p:clrMapOvr>
+</p:sld>
+</file>
+
+<file path=ppt/slides/slide5.xml><?xml version="1.0" encoding="utf-8"?>
+<p:sld xmlns:a="http://schemas.openxmlformats.org/drawingml/2006/main" xmlns:r="http://schemas.openxmlformats.org/officeDocument/2006/relationships" xmlns:p="http://schemas.openxmlformats.org/presentationml/2006/main">
+  <p:cSld>
+    <p:spTree>
+      <p:nvGrpSpPr>
+        <p:cNvPr id="1" name=""/>
+        <p:cNvGrpSpPr/>
+        <p:nvPr/>
+      </p:nvGrpSpPr>
+      <p:grpSpPr>
+        <a:xfrm>
+          <a:off x="0" y="0"/>
+          <a:ext cx="0" cy="0"/>
+          <a:chOff x="0" y="0"/>
+          <a:chExt cx="0" cy="0"/>
+        </a:xfrm>
+      </p:grpSpPr>
+      <p:sp>
+        <p:nvSpPr>
+          <p:cNvPr id="2" name="Title 1"/>
+          <p:cNvSpPr>
+            <a:spLocks noGrp="1"/>
+          </p:cNvSpPr>
+          <p:nvPr>
+            <p:ph type="title"/>
+          </p:nvPr>
+        </p:nvSpPr>
+        <p:spPr/>
+        <p:txBody>
+          <a:bodyPr/>
+          <a:lstStyle/>
+          <a:p>
+            <a:r>
+              <a:rPr lang="en-US" dirty="0" smtClean="0"/>
+              <a:t>Scan Line System </a:t>
+            </a:r>
+            <a:r>
+              <a:rPr lang="en-US" dirty="0"/>
+              <a:t>Architecture</a:t>
+            </a:r>
+          </a:p>
+        </p:txBody>
+      </p:sp>
+      <p:pic>
+        <p:nvPicPr>
+          <p:cNvPr id="3" name="Picture 2" descr="Screen Shot 2014-12-02 at 1.26.50 PM.png"/>
+          <p:cNvPicPr>
+            <a:picLocks noChangeAspect="1"/>
+          </p:cNvPicPr>
+          <p:nvPr/>
+        </p:nvPicPr>
+        <p:blipFill rotWithShape="1">
+          <a:blip r:embed="rId2">
+            <a:extLst>
+              <a:ext uri="{28A0092B-C50C-407E-A947-70E740481C1C}">
+                <a14:useLocalDpi xmlns:a14="http://schemas.microsoft.com/office/drawing/2010/main" val="0"/>
+              </a:ext>
+            </a:extLst>
+          </a:blip>
+          <a:srcRect t="5206"/>
+          <a:stretch/>
+        </p:blipFill>
+        <p:spPr>
+          <a:xfrm>
+            <a:off x="818444" y="1693333"/>
+            <a:ext cx="10484556" cy="5164667"/>
+          </a:xfrm>
+          <a:prstGeom prst="rect">
+            <a:avLst/>
+          </a:prstGeom>
+        </p:spPr>
+      </p:pic>
+    </p:spTree>
+    <p:extLst>
+      <p:ext uri="{BB962C8B-B14F-4D97-AF65-F5344CB8AC3E}">
+        <p14:creationId xmlns:p14="http://schemas.microsoft.com/office/powerpoint/2010/main" val="1282560796"/>
+      </p:ext>
+    </p:extLst>
+  </p:cSld>
+  <p:clrMapOvr>
+    <a:masterClrMapping/>
+  </p:clrMapOvr>
+</p:sld>
+</file>
+
+<file path=ppt/slides/slide6.xml><?xml version="1.0" encoding="utf-8"?>
+<p:sld xmlns:a="http://schemas.openxmlformats.org/drawingml/2006/main" xmlns:r="http://schemas.openxmlformats.org/officeDocument/2006/relationships" xmlns:p="http://schemas.openxmlformats.org/presentationml/2006/main">
+  <p:cSld>
+    <p:spTree>
+      <p:nvGrpSpPr>
+        <p:cNvPr id="1" name=""/>
+        <p:cNvGrpSpPr/>
+        <p:nvPr/>
+      </p:nvGrpSpPr>
+      <p:grpSpPr>
+        <a:xfrm>
+          <a:off x="0" y="0"/>
+          <a:ext cx="0" cy="0"/>
+          <a:chOff x="0" y="0"/>
+          <a:chExt cx="0" cy="0"/>
+        </a:xfrm>
+      </p:grpSpPr>
+      <p:sp>
+        <p:nvSpPr>
+          <p:cNvPr id="2" name="Title 1"/>
+          <p:cNvSpPr>
+            <a:spLocks noGrp="1"/>
+          </p:cNvSpPr>
+          <p:nvPr>
+            <p:ph type="ctrTitle"/>
+          </p:nvPr>
+        </p:nvSpPr>
+        <p:spPr/>
+        <p:txBody>
+          <a:bodyPr/>
+          <a:lstStyle/>
+          <a:p>
+            <a:r>
+              <a:rPr lang="en-US" dirty="0" smtClean="0"/>
+              <a:t>Ray Tracing</a:t>
+            </a:r>
+            <a:endParaRPr lang="en-IN" dirty="0"/>
+          </a:p>
+        </p:txBody>
+      </p:sp>
+    </p:spTree>
+    <p:extLst>
+      <p:ext uri="{BB962C8B-B14F-4D97-AF65-F5344CB8AC3E}">
+        <p14:creationId xmlns:p14="http://schemas.microsoft.com/office/powerpoint/2010/main" val="3272576113"/>
+      </p:ext>
+    </p:extLst>
+  </p:cSld>
+  <p:clrMapOvr>
+    <a:masterClrMapping/>
+  </p:clrMapOvr>
+  <p:timing>
+    <p:tnLst>
+      <p:par>
+        <p:cTn xmlns:p14="http://schemas.microsoft.com/office/powerpoint/2010/main" id="1" dur="indefinite" restart="never" nodeType="tmRoot"/>
+      </p:par>
+    </p:tnLst>
+  </p:timing>
+</p:sld>
+</file>
+
+<file path=ppt/slides/slide7.xml><?xml version="1.0" encoding="utf-8"?>
+<p:sld xmlns:a="http://schemas.openxmlformats.org/drawingml/2006/main" xmlns:r="http://schemas.openxmlformats.org/officeDocument/2006/relationships" xmlns:p="http://schemas.openxmlformats.org/presentationml/2006/main">
+  <p:cSld>
+    <p:spTree>
+      <p:nvGrpSpPr>
+        <p:cNvPr id="1" name=""/>
+        <p:cNvGrpSpPr/>
+        <p:nvPr/>
+      </p:nvGrpSpPr>
+      <p:grpSpPr>
+        <a:xfrm>
+          <a:off x="0" y="0"/>
+          <a:ext cx="0" cy="0"/>
+          <a:chOff x="0" y="0"/>
+          <a:chExt cx="0" cy="0"/>
+        </a:xfrm>
+      </p:grpSpPr>
+      <p:sp>
+        <p:nvSpPr>
+          <p:cNvPr id="2" name="Title 1"/>
+          <p:cNvSpPr>
+            <a:spLocks noGrp="1"/>
+          </p:cNvSpPr>
+          <p:nvPr>
+            <p:ph type="title"/>
+          </p:nvPr>
+        </p:nvSpPr>
+        <p:spPr/>
+        <p:txBody>
+          <a:bodyPr/>
+          <a:lstStyle/>
+          <a:p>
+            <a:r>
+              <a:rPr lang="en-US" dirty="0" smtClean="0"/>
+              <a:t>Ray Tracing Implementation </a:t>
+            </a:r>
+            <a:br>
+              <a:rPr lang="en-US" dirty="0" smtClean="0"/>
+            </a:br>
+            <a:r>
+              <a:rPr lang="en-US" dirty="0" smtClean="0"/>
+              <a:t>– Eye to Object</a:t>
+            </a:r>
+            <a:endParaRPr lang="en-IN" dirty="0"/>
+          </a:p>
+        </p:txBody>
+      </p:sp>
+      <p:sp>
+        <p:nvSpPr>
+          <p:cNvPr id="3" name="Content Placeholder 2"/>
+          <p:cNvSpPr>
+            <a:spLocks noGrp="1"/>
+          </p:cNvSpPr>
+          <p:nvPr>
+            <p:ph idx="1"/>
+          </p:nvPr>
+        </p:nvSpPr>
+        <p:spPr>
+          <a:xfrm>
+            <a:off x="838200" y="1825625"/>
+            <a:ext cx="6503894" cy="4351338"/>
+          </a:xfrm>
+        </p:spPr>
+        <p:txBody>
+          <a:bodyPr>
+            <a:noAutofit/>
+          </a:bodyPr>
+          <a:lstStyle/>
+          <a:p>
+            <a:pPr marL="0" indent="0">
+              <a:buNone/>
+            </a:pPr>
+            <a:r>
+              <a:rPr lang="en-US" dirty="0" smtClean="0"/>
+              <a:t>For every pixel value </a:t>
+            </a:r>
+          </a:p>
+          <a:p>
+            <a:pPr marL="0" indent="0">
+              <a:buNone/>
+            </a:pPr>
+            <a:r>
+              <a:rPr lang="en-US" dirty="0" smtClean="0"/>
+              <a:t>- Map the pixel value to the vector space </a:t>
+            </a:r>
+          </a:p>
+          <a:p>
+            <a:pPr marL="0" indent="0">
+              <a:buNone/>
+            </a:pPr>
+            <a:r>
+              <a:rPr lang="en-US" dirty="0" smtClean="0"/>
+              <a:t>- Calculate the ray’s position and direction</a:t>
+            </a:r>
+          </a:p>
+          <a:p>
+            <a:pPr marL="0" indent="0">
+              <a:buNone/>
+            </a:pPr>
+            <a:r>
+              <a:rPr lang="en-US" dirty="0" smtClean="0"/>
+              <a:t>- Calculate the point on the ray using the rays parametric </a:t>
+            </a:r>
+            <a:r>
+              <a:rPr lang="en-US" dirty="0" smtClean="0"/>
+              <a:t>equation</a:t>
+            </a:r>
+            <a:endParaRPr lang="en-US" dirty="0" smtClean="0"/>
+          </a:p>
+        </p:txBody>
+      </p:sp>
+      <p:pic>
+        <p:nvPicPr>
+          <p:cNvPr id="4" name="Picture 3"/>
+          <p:cNvPicPr>
+            <a:picLocks noChangeAspect="1"/>
+          </p:cNvPicPr>
+          <p:nvPr/>
+        </p:nvPicPr>
+        <p:blipFill>
+          <a:blip r:embed="rId3"/>
+          <a:stretch>
+            <a:fillRect/>
+          </a:stretch>
+        </p:blipFill>
+        <p:spPr>
+          <a:xfrm>
+            <a:off x="7689756" y="2123514"/>
+            <a:ext cx="4181475" cy="2970597"/>
+          </a:xfrm>
+          <a:prstGeom prst="rect">
+            <a:avLst/>
+          </a:prstGeom>
+        </p:spPr>
+      </p:pic>
+      <p:cxnSp>
+        <p:nvCxnSpPr>
+          <p:cNvPr id="6" name="Straight Arrow Connector 5"/>
+          <p:cNvCxnSpPr/>
+          <p:nvPr/>
+        </p:nvCxnSpPr>
+        <p:spPr>
+          <a:xfrm flipV="1">
+            <a:off x="8538882" y="3442447"/>
+            <a:ext cx="0" cy="672353"/>
+          </a:xfrm>
+          <a:prstGeom prst="straightConnector1">
+            <a:avLst/>
+          </a:prstGeom>
+          <a:ln>
+            <a:tailEnd type="triangle"/>
+          </a:ln>
+        </p:spPr>
+        <p:style>
+          <a:lnRef idx="1">
+            <a:schemeClr val="accent1"/>
+          </a:lnRef>
+          <a:fillRef idx="0">
+            <a:schemeClr val="accent1"/>
+          </a:fillRef>
+          <a:effectRef idx="0">
+            <a:schemeClr val="accent1"/>
+          </a:effectRef>
+          <a:fontRef idx="minor">
+            <a:schemeClr val="tx1"/>
+          </a:fontRef>
+        </p:style>
+      </p:cxnSp>
+      <p:cxnSp>
+        <p:nvCxnSpPr>
+          <p:cNvPr id="8" name="Straight Arrow Connector 7"/>
+          <p:cNvCxnSpPr/>
+          <p:nvPr/>
+        </p:nvCxnSpPr>
+        <p:spPr>
+          <a:xfrm flipH="1">
+            <a:off x="8081682" y="4128247"/>
+            <a:ext cx="457200" cy="618565"/>
+          </a:xfrm>
+          <a:prstGeom prst="straightConnector1">
+            <a:avLst/>
+          </a:prstGeom>
+          <a:ln>
+            <a:tailEnd type="triangle"/>
+          </a:ln>
+        </p:spPr>
+        <p:style>
+          <a:lnRef idx="1">
+            <a:schemeClr val="accent1"/>
+          </a:lnRef>
+          <a:fillRef idx="0">
+            <a:schemeClr val="accent1"/>
+          </a:fillRef>
+          <a:effectRef idx="0">
+            <a:schemeClr val="accent1"/>
+          </a:effectRef>
+          <a:fontRef idx="minor">
+            <a:schemeClr val="tx1"/>
+          </a:fontRef>
+        </p:style>
+      </p:cxnSp>
+      <p:sp>
+        <p:nvSpPr>
+          <p:cNvPr id="9" name="TextBox 8"/>
+          <p:cNvSpPr txBox="1"/>
+          <p:nvPr/>
+        </p:nvSpPr>
+        <p:spPr>
+          <a:xfrm>
+            <a:off x="7788635" y="4658417"/>
+            <a:ext cx="288862" cy="369332"/>
+          </a:xfrm>
+          <a:prstGeom prst="rect">
+            <a:avLst/>
+          </a:prstGeom>
+          <a:noFill/>
+        </p:spPr>
+        <p:txBody>
+          <a:bodyPr wrap="none" rtlCol="0">
+            <a:spAutoFit/>
+          </a:bodyPr>
+          <a:lstStyle/>
+          <a:p>
+            <a:r>
+              <a:rPr lang="en-US" dirty="0"/>
+              <a:t>v</a:t>
+            </a:r>
+            <a:endParaRPr lang="en-IN" dirty="0"/>
+          </a:p>
+        </p:txBody>
+      </p:sp>
+      <p:sp>
+        <p:nvSpPr>
+          <p:cNvPr id="10" name="TextBox 9"/>
+          <p:cNvSpPr txBox="1"/>
+          <p:nvPr/>
+        </p:nvSpPr>
+        <p:spPr>
+          <a:xfrm>
+            <a:off x="8385635" y="3088704"/>
+            <a:ext cx="306494" cy="369332"/>
+          </a:xfrm>
+          <a:prstGeom prst="rect">
+            <a:avLst/>
+          </a:prstGeom>
+          <a:noFill/>
+        </p:spPr>
+        <p:txBody>
+          <a:bodyPr wrap="none" rtlCol="0">
+            <a:spAutoFit/>
+          </a:bodyPr>
+          <a:lstStyle/>
+          <a:p>
+            <a:r>
+              <a:rPr lang="en-US" dirty="0" smtClean="0"/>
+              <a:t>u</a:t>
+            </a:r>
+            <a:endParaRPr lang="en-IN" dirty="0"/>
+          </a:p>
+        </p:txBody>
+      </p:sp>
+    </p:spTree>
+    <p:extLst>
+      <p:ext uri="{BB962C8B-B14F-4D97-AF65-F5344CB8AC3E}">
+        <p14:creationId xmlns:p14="http://schemas.microsoft.com/office/powerpoint/2010/main" val="970896719"/>
+      </p:ext>
+    </p:extLst>
+  </p:cSld>
+  <p:clrMapOvr>
+    <a:masterClrMapping/>
+  </p:clrMapOvr>
+</p:sld>
+</file>
+
+<file path=ppt/slides/slide8.xml><?xml version="1.0" encoding="utf-8"?>
+<p:sld xmlns:a="http://schemas.openxmlformats.org/drawingml/2006/main" xmlns:r="http://schemas.openxmlformats.org/officeDocument/2006/relationships" xmlns:p="http://schemas.openxmlformats.org/presentationml/2006/main">
+  <p:cSld>
+    <p:spTree>
+      <p:nvGrpSpPr>
+        <p:cNvPr id="1" name=""/>
+        <p:cNvGrpSpPr/>
+        <p:nvPr/>
+      </p:nvGrpSpPr>
+      <p:grpSpPr>
+        <a:xfrm>
+          <a:off x="0" y="0"/>
+          <a:ext cx="0" cy="0"/>
+          <a:chOff x="0" y="0"/>
+          <a:chExt cx="0" cy="0"/>
+        </a:xfrm>
+      </p:grpSpPr>
+      <p:sp>
+        <p:nvSpPr>
+          <p:cNvPr id="2" name="Title 1"/>
+          <p:cNvSpPr>
+            <a:spLocks noGrp="1"/>
+          </p:cNvSpPr>
+          <p:nvPr>
+            <p:ph type="title"/>
+          </p:nvPr>
+        </p:nvSpPr>
+        <p:spPr/>
+        <p:txBody>
+          <a:bodyPr/>
+          <a:lstStyle/>
+          <a:p>
+            <a:r>
+              <a:rPr lang="en-US" dirty="0" smtClean="0"/>
+              <a:t>Ray Tracing cont’d</a:t>
+            </a:r>
+            <a:endParaRPr lang="en-US" dirty="0"/>
+          </a:p>
+        </p:txBody>
+      </p:sp>
+      <p:pic>
+        <p:nvPicPr>
+          <p:cNvPr id="4" name="Picture 3" descr="640px-Ray_trace_diagram.svg.png"/>
+          <p:cNvPicPr>
+            <a:picLocks noChangeAspect="1"/>
+          </p:cNvPicPr>
+          <p:nvPr/>
+        </p:nvPicPr>
+        <p:blipFill>
+          <a:blip r:embed="rId2">
+            <a:extLst>
+              <a:ext uri="{28A0092B-C50C-407E-A947-70E740481C1C}">
+                <a14:useLocalDpi xmlns:a14="http://schemas.microsoft.com/office/drawing/2010/main" val="0"/>
+              </a:ext>
+            </a:extLst>
+          </a:blip>
+          <a:stretch>
+            <a:fillRect/>
+          </a:stretch>
+        </p:blipFill>
+        <p:spPr>
+          <a:xfrm>
+            <a:off x="5675177" y="2029289"/>
+            <a:ext cx="6229504" cy="4146513"/>
+          </a:xfrm>
+          <a:prstGeom prst="rect">
+            <a:avLst/>
+          </a:prstGeom>
+        </p:spPr>
+      </p:pic>
+      <p:sp>
+        <p:nvSpPr>
+          <p:cNvPr id="5" name="TextBox 4"/>
+          <p:cNvSpPr txBox="1"/>
+          <p:nvPr/>
+        </p:nvSpPr>
+        <p:spPr>
+          <a:xfrm>
+            <a:off x="-26238" y="1888412"/>
+            <a:ext cx="5816316" cy="4893647"/>
+          </a:xfrm>
+          <a:prstGeom prst="rect">
+            <a:avLst/>
+          </a:prstGeom>
+          <a:noFill/>
+        </p:spPr>
+        <p:txBody>
+          <a:bodyPr wrap="none" rtlCol="0">
+            <a:spAutoFit/>
+          </a:bodyPr>
+          <a:lstStyle/>
+          <a:p>
+            <a:r>
+              <a:rPr lang="en-US" sz="2400" dirty="0" smtClean="0"/>
+              <a:t>-   </a:t>
+            </a:r>
+            <a:r>
+              <a:rPr lang="en-US" sz="2400" dirty="0"/>
+              <a:t>For every triangle in the geometry </a:t>
+            </a:r>
+            <a:endParaRPr lang="en-US" sz="2400" dirty="0" smtClean="0"/>
+          </a:p>
+          <a:p>
+            <a:pPr marL="285750" indent="-285750">
+              <a:buFontTx/>
+              <a:buChar char="-"/>
+            </a:pPr>
+            <a:r>
+              <a:rPr lang="en-US" sz="2400" dirty="0" smtClean="0"/>
+              <a:t>Calculate </a:t>
+            </a:r>
+            <a:r>
+              <a:rPr lang="en-US" sz="2400" dirty="0"/>
+              <a:t>the normal and check if the </a:t>
+            </a:r>
+            <a:endParaRPr lang="en-US" sz="2400" dirty="0" smtClean="0"/>
+          </a:p>
+          <a:p>
+            <a:r>
+              <a:rPr lang="en-US" sz="2400" dirty="0"/>
+              <a:t> </a:t>
+            </a:r>
+            <a:r>
+              <a:rPr lang="en-US" sz="2400" dirty="0" smtClean="0"/>
+              <a:t>   dot </a:t>
+            </a:r>
+            <a:r>
+              <a:rPr lang="en-US" sz="2400" dirty="0"/>
+              <a:t>product </a:t>
+            </a:r>
+            <a:r>
+              <a:rPr lang="en-US" sz="2400" dirty="0" smtClean="0"/>
+              <a:t>of </a:t>
+            </a:r>
+            <a:r>
+              <a:rPr lang="en-US" sz="2400" dirty="0"/>
+              <a:t>the normal and the </a:t>
+            </a:r>
+            <a:endParaRPr lang="en-US" sz="2400" dirty="0" smtClean="0"/>
+          </a:p>
+          <a:p>
+            <a:r>
+              <a:rPr lang="en-US" sz="2400" dirty="0"/>
+              <a:t> </a:t>
+            </a:r>
+            <a:r>
+              <a:rPr lang="en-US" sz="2400" dirty="0" smtClean="0"/>
+              <a:t>   direction </a:t>
+            </a:r>
+            <a:r>
+              <a:rPr lang="en-US" sz="2400" dirty="0"/>
+              <a:t>is not equal to 0</a:t>
+            </a:r>
+          </a:p>
+          <a:p>
+            <a:pPr marL="285750" indent="-285750">
+              <a:buFontTx/>
+              <a:buChar char="-"/>
+            </a:pPr>
+            <a:r>
+              <a:rPr lang="en-US" sz="2400" dirty="0" smtClean="0"/>
+              <a:t>Calculate </a:t>
+            </a:r>
+            <a:r>
+              <a:rPr lang="en-US" sz="2400" dirty="0"/>
+              <a:t>the intersection of the ray with </a:t>
+            </a:r>
+            <a:endParaRPr lang="en-US" sz="2400" dirty="0" smtClean="0"/>
+          </a:p>
+          <a:p>
+            <a:r>
+              <a:rPr lang="en-US" sz="2400" dirty="0"/>
+              <a:t> </a:t>
+            </a:r>
+            <a:r>
+              <a:rPr lang="en-US" sz="2400" dirty="0" smtClean="0"/>
+              <a:t>   the </a:t>
+            </a:r>
+            <a:r>
+              <a:rPr lang="en-US" sz="2400" dirty="0"/>
+              <a:t>triangle </a:t>
+            </a:r>
+            <a:r>
+              <a:rPr lang="en-US" sz="2400" dirty="0" smtClean="0"/>
+              <a:t>plane </a:t>
+            </a:r>
+            <a:r>
+              <a:rPr lang="en-US" sz="2400" dirty="0"/>
+              <a:t>and check whether it is </a:t>
+            </a:r>
+            <a:endParaRPr lang="en-US" sz="2400" dirty="0" smtClean="0"/>
+          </a:p>
+          <a:p>
+            <a:r>
+              <a:rPr lang="en-US" sz="2400" dirty="0"/>
+              <a:t> </a:t>
+            </a:r>
+            <a:r>
+              <a:rPr lang="en-US" sz="2400" dirty="0" smtClean="0"/>
+              <a:t>   the </a:t>
+            </a:r>
+            <a:r>
+              <a:rPr lang="en-US" sz="2400" dirty="0"/>
+              <a:t>minimum positive </a:t>
+            </a:r>
+            <a:r>
+              <a:rPr lang="en-US" sz="2400" dirty="0" smtClean="0"/>
+              <a:t>intersection </a:t>
+            </a:r>
+            <a:r>
+              <a:rPr lang="en-US" sz="2400" dirty="0"/>
+              <a:t>and </a:t>
+            </a:r>
+            <a:endParaRPr lang="en-US" sz="2400" dirty="0" smtClean="0"/>
+          </a:p>
+          <a:p>
+            <a:r>
+              <a:rPr lang="en-US" sz="2400" dirty="0"/>
+              <a:t> </a:t>
+            </a:r>
+            <a:r>
+              <a:rPr lang="en-US" sz="2400" dirty="0" smtClean="0"/>
+              <a:t>   whether </a:t>
+            </a:r>
+            <a:r>
+              <a:rPr lang="en-US" sz="2400" dirty="0"/>
+              <a:t>the point lies inside the </a:t>
+            </a:r>
+            <a:r>
+              <a:rPr lang="en-US" sz="2400" dirty="0" smtClean="0"/>
+              <a:t>triangle </a:t>
+            </a:r>
+          </a:p>
+          <a:p>
+            <a:r>
+              <a:rPr lang="en-US" sz="2400" dirty="0"/>
+              <a:t> </a:t>
+            </a:r>
+            <a:r>
+              <a:rPr lang="en-US" sz="2400" dirty="0" smtClean="0"/>
+              <a:t>   or not.</a:t>
+            </a:r>
+            <a:endParaRPr lang="en-US" sz="2400" dirty="0"/>
+          </a:p>
+          <a:p>
+            <a:pPr marL="342900" indent="-342900">
+              <a:buFontTx/>
+              <a:buChar char="-"/>
+            </a:pPr>
+            <a:r>
+              <a:rPr lang="en-US" sz="2400" dirty="0" smtClean="0"/>
+              <a:t>For </a:t>
+            </a:r>
+            <a:r>
+              <a:rPr lang="en-US" sz="2400" dirty="0"/>
+              <a:t>the minimum intersection value that </a:t>
+            </a:r>
+            <a:endParaRPr lang="en-US" sz="2400" dirty="0" smtClean="0"/>
+          </a:p>
+          <a:p>
+            <a:r>
+              <a:rPr lang="en-US" sz="2400" dirty="0"/>
+              <a:t> </a:t>
+            </a:r>
+            <a:r>
+              <a:rPr lang="en-US" sz="2400" dirty="0" smtClean="0"/>
+              <a:t>   lies within </a:t>
+            </a:r>
+            <a:r>
+              <a:rPr lang="en-US" sz="2400" dirty="0"/>
+              <a:t>the </a:t>
+            </a:r>
+            <a:r>
+              <a:rPr lang="en-US" sz="2400" dirty="0" smtClean="0"/>
+              <a:t>triangle </a:t>
+            </a:r>
+            <a:r>
+              <a:rPr lang="en-US" sz="2400" dirty="0"/>
+              <a:t>we compute the </a:t>
+            </a:r>
+            <a:endParaRPr lang="en-US" sz="2400" dirty="0" smtClean="0"/>
+          </a:p>
+          <a:p>
+            <a:r>
+              <a:rPr lang="en-US" sz="2400" dirty="0"/>
+              <a:t> </a:t>
+            </a:r>
+            <a:r>
+              <a:rPr lang="en-US" sz="2400" dirty="0" smtClean="0"/>
+              <a:t>   color </a:t>
+            </a:r>
+            <a:r>
+              <a:rPr lang="en-US" sz="2400" dirty="0"/>
+              <a:t>of </a:t>
+            </a:r>
+            <a:r>
+              <a:rPr lang="en-US" sz="2400" dirty="0" smtClean="0"/>
+              <a:t>that pixel.</a:t>
+            </a:r>
+            <a:endParaRPr lang="en-IN" sz="2400" dirty="0"/>
+          </a:p>
+          <a:p>
+            <a:endParaRPr lang="en-US" sz="2400" dirty="0"/>
+          </a:p>
+        </p:txBody>
+      </p:sp>
+    </p:spTree>
+    <p:extLst>
+      <p:ext uri="{BB962C8B-B14F-4D97-AF65-F5344CB8AC3E}">
+        <p14:creationId xmlns:p14="http://schemas.microsoft.com/office/powerpoint/2010/main" val="337465257"/>
+      </p:ext>
+    </p:extLst>
+  </p:cSld>
+  <p:clrMapOvr>
+    <a:masterClrMapping/>
+  </p:clrMapOvr>
+</p:sld>
+</file>
+
+<file path=ppt/slides/slide9.xml><?xml version="1.0" encoding="utf-8"?>
+<p:sld xmlns:a="http://schemas.openxmlformats.org/drawingml/2006/main" xmlns:r="http://schemas.openxmlformats.org/officeDocument/2006/relationships" xmlns:p="http://schemas.openxmlformats.org/presentationml/2006/main">
+  <p:cSld>
+    <p:spTree>
+      <p:nvGrpSpPr>
+        <p:cNvPr id="1" name=""/>
+        <p:cNvGrpSpPr/>
+        <p:nvPr/>
+      </p:nvGrpSpPr>
+      <p:grpSpPr>
+        <a:xfrm>
+          <a:off x="0" y="0"/>
+          <a:ext cx="0" cy="0"/>
+          <a:chOff x="0" y="0"/>
+          <a:chExt cx="0" cy="0"/>
+        </a:xfrm>
+      </p:grpSpPr>
+      <p:sp>
+        <p:nvSpPr>
+          <p:cNvPr id="2" name="Title 1"/>
+          <p:cNvSpPr>
+            <a:spLocks noGrp="1"/>
+          </p:cNvSpPr>
+          <p:nvPr>
+            <p:ph type="ctrTitle"/>
+          </p:nvPr>
+        </p:nvSpPr>
+        <p:spPr/>
+        <p:txBody>
+          <a:bodyPr/>
+          <a:lstStyle/>
+          <a:p>
+            <a:r>
+              <a:rPr lang="en-US" dirty="0" smtClean="0"/>
+              <a:t>Volumetric Shadow Rendering</a:t>
+            </a:r>
+            <a:endParaRPr lang="en-IN" dirty="0"/>
+          </a:p>
+        </p:txBody>
+      </p:sp>
+    </p:spTree>
+    <p:extLst>
+      <p:ext uri="{BB962C8B-B14F-4D97-AF65-F5344CB8AC3E}">
+        <p14:creationId xmlns:p14="http://schemas.microsoft.com/office/powerpoint/2010/main" val="438057298"/>
+      </p:ext>
+    </p:extLst>
+  </p:cSld>
+  <p:clrMapOvr>
+    <a:masterClrMapping/>
+  </p:clrMapOvr>
 </p:sld>
 </file>
 
@@ -9513,7 +9877,7 @@
   <a:extraClrSchemeLst/>
   <a:extLst>
     <a:ext uri="{05A4C25C-085E-4340-85A3-A5531E510DB2}">
-      <thm15:themeFamily xmlns:thm15="http://schemas.microsoft.com/office/thememl/2012/main" xmlns="" name="Office Theme" id="{62F939B6-93AF-4DB8-9C6B-D6C7DFDC589F}" vid="{4A3C46E8-61CC-4603-A589-7422A47A8E4A}"/>
+      <thm15:themeFamily xmlns="" xmlns:thm15="http://schemas.microsoft.com/office/thememl/2012/main" name="Office Theme" id="{62F939B6-93AF-4DB8-9C6B-D6C7DFDC589F}" vid="{4A3C46E8-61CC-4603-A589-7422A47A8E4A}"/>
     </a:ext>
   </a:extLst>
 </a:theme>

</xml_diff>